<commit_message>
Class Diagram and PDF
Finished UML Class diagram in UMLet, updated powerpoint, and exported to PDF.
</commit_message>
<xml_diff>
--- a/UMLAssignment/UML.pptx
+++ b/UMLAssignment/UML.pptx
@@ -9,7 +9,7 @@
   </p:notesMasterIdLst>
   <p:sldIdLst>
     <p:sldId id="256" r:id="rId2"/>
-    <p:sldId id="257" r:id="rId3"/>
+    <p:sldId id="269" r:id="rId3"/>
     <p:sldId id="260" r:id="rId4"/>
     <p:sldId id="262" r:id="rId5"/>
     <p:sldId id="261" r:id="rId6"/>
@@ -129,411 +129,6 @@
 </p:presentation>
 </file>
 
-<file path=ppt/ink/ink1.xml><?xml version="1.0" encoding="utf-8"?>
-<inkml:ink xmlns:inkml="http://www.w3.org/2003/InkML">
-  <inkml:definitions>
-    <inkml:context xml:id="ctx0">
-      <inkml:inkSource xml:id="inkSrc0">
-        <inkml:traceFormat>
-          <inkml:channel name="X" type="integer" min="-2.14748E9" max="2.14748E9" units="cm"/>
-          <inkml:channel name="Y" type="integer" min="-2.14748E9" max="2.14748E9" units="cm"/>
-          <inkml:channel name="F" type="integer" max="32767" units="dev"/>
-        </inkml:traceFormat>
-        <inkml:channelProperties>
-          <inkml:channelProperty channel="X" name="resolution" value="1000" units="1/cm"/>
-          <inkml:channelProperty channel="Y" name="resolution" value="1000" units="1/cm"/>
-          <inkml:channelProperty channel="F" name="resolution" value="0" units="1/dev"/>
-        </inkml:channelProperties>
-      </inkml:inkSource>
-      <inkml:timestamp xml:id="ts0" timeString="2022-04-05T21:22:20.962"/>
-    </inkml:context>
-    <inkml:brush xml:id="br0">
-      <inkml:brushProperty name="width" value="0.05" units="cm"/>
-      <inkml:brushProperty name="height" value="0.05" units="cm"/>
-    </inkml:brush>
-  </inkml:definitions>
-  <inkml:trace contextRef="#ctx0" brushRef="#br0">0 409 24575,'42'-23'0,"64"-48"0,-37 23 0,-3 3 0,39-25 0,-47 45 0,-49 23 0,-1-1 0,0 0 0,0-1 0,-1 1 0,1-1 0,-1-1 0,0 1 0,0-1 0,0-1 0,-1 1 0,1-1 0,7-9 0,32-46 0,-49 67 0,1-1 0,1 1 0,-1 1 0,1-1 0,0 0 0,1 0 0,-1 0 0,1 1 0,1-1 0,0 8 0,0-6 0,-1-1 0,1 0 0,1 0 0,-1 1 0,1-1 0,1 0 0,-1 0 0,1-1 0,0 1 0,1-1 0,4 8 0,82 103 0,-84-109 0,1 0 0,0 0 0,11 9 0,-10-10 0,-1 0 0,0 0 0,10 15 0,10 16 0,-15-22 0,-1 1 0,-1 0 0,0 0 0,10 27 0,1 4-1365,-14-34-5461</inkml:trace>
-</inkml:ink>
-</file>
-
-<file path=ppt/ink/ink10.xml><?xml version="1.0" encoding="utf-8"?>
-<inkml:ink xmlns:inkml="http://www.w3.org/2003/InkML">
-  <inkml:definitions>
-    <inkml:context xml:id="ctx0">
-      <inkml:inkSource xml:id="inkSrc0">
-        <inkml:traceFormat>
-          <inkml:channel name="X" type="integer" min="-2.14748E9" max="2.14748E9" units="cm"/>
-          <inkml:channel name="Y" type="integer" min="-2.14748E9" max="2.14748E9" units="cm"/>
-          <inkml:channel name="F" type="integer" max="32767" units="dev"/>
-        </inkml:traceFormat>
-        <inkml:channelProperties>
-          <inkml:channelProperty channel="X" name="resolution" value="1000" units="1/cm"/>
-          <inkml:channelProperty channel="Y" name="resolution" value="1000" units="1/cm"/>
-          <inkml:channelProperty channel="F" name="resolution" value="0" units="1/dev"/>
-        </inkml:channelProperties>
-      </inkml:inkSource>
-      <inkml:timestamp xml:id="ts0" timeString="2022-04-05T21:35:05.228"/>
-    </inkml:context>
-    <inkml:brush xml:id="br0">
-      <inkml:brushProperty name="width" value="0.05" units="cm"/>
-      <inkml:brushProperty name="height" value="0.05" units="cm"/>
-    </inkml:brush>
-  </inkml:definitions>
-  <inkml:trace contextRef="#ctx0" brushRef="#br0">0 1 24575</inkml:trace>
-</inkml:ink>
-</file>
-
-<file path=ppt/ink/ink11.xml><?xml version="1.0" encoding="utf-8"?>
-<inkml:ink xmlns:inkml="http://www.w3.org/2003/InkML">
-  <inkml:definitions>
-    <inkml:context xml:id="ctx0">
-      <inkml:inkSource xml:id="inkSrc0">
-        <inkml:traceFormat>
-          <inkml:channel name="X" type="integer" min="-2.14748E9" max="2.14748E9" units="cm"/>
-          <inkml:channel name="Y" type="integer" min="-2.14748E9" max="2.14748E9" units="cm"/>
-          <inkml:channel name="F" type="integer" max="32767" units="dev"/>
-        </inkml:traceFormat>
-        <inkml:channelProperties>
-          <inkml:channelProperty channel="X" name="resolution" value="1000" units="1/cm"/>
-          <inkml:channelProperty channel="Y" name="resolution" value="1000" units="1/cm"/>
-          <inkml:channelProperty channel="F" name="resolution" value="0" units="1/dev"/>
-        </inkml:channelProperties>
-      </inkml:inkSource>
-      <inkml:timestamp xml:id="ts0" timeString="2022-04-05T21:35:05.911"/>
-    </inkml:context>
-    <inkml:brush xml:id="br0">
-      <inkml:brushProperty name="width" value="0.05" units="cm"/>
-      <inkml:brushProperty name="height" value="0.05" units="cm"/>
-    </inkml:brush>
-  </inkml:definitions>
-  <inkml:trace contextRef="#ctx0" brushRef="#br0">0 1 24575,'0'0'-8191</inkml:trace>
-</inkml:ink>
-</file>
-
-<file path=ppt/ink/ink12.xml><?xml version="1.0" encoding="utf-8"?>
-<inkml:ink xmlns:inkml="http://www.w3.org/2003/InkML">
-  <inkml:definitions>
-    <inkml:context xml:id="ctx0">
-      <inkml:inkSource xml:id="inkSrc0">
-        <inkml:traceFormat>
-          <inkml:channel name="X" type="integer" min="-2.14748E9" max="2.14748E9" units="cm"/>
-          <inkml:channel name="Y" type="integer" min="-2.14748E9" max="2.14748E9" units="cm"/>
-          <inkml:channel name="F" type="integer" max="32767" units="dev"/>
-        </inkml:traceFormat>
-        <inkml:channelProperties>
-          <inkml:channelProperty channel="X" name="resolution" value="1000" units="1/cm"/>
-          <inkml:channelProperty channel="Y" name="resolution" value="1000" units="1/cm"/>
-          <inkml:channelProperty channel="F" name="resolution" value="0" units="1/dev"/>
-        </inkml:channelProperties>
-      </inkml:inkSource>
-      <inkml:timestamp xml:id="ts0" timeString="2022-04-05T21:35:06.534"/>
-    </inkml:context>
-    <inkml:brush xml:id="br0">
-      <inkml:brushProperty name="width" value="0.05" units="cm"/>
-      <inkml:brushProperty name="height" value="0.05" units="cm"/>
-    </inkml:brush>
-  </inkml:definitions>
-  <inkml:trace contextRef="#ctx0" brushRef="#br0">0 0 24575,'0'0'-8191</inkml:trace>
-</inkml:ink>
-</file>
-
-<file path=ppt/ink/ink13.xml><?xml version="1.0" encoding="utf-8"?>
-<inkml:ink xmlns:inkml="http://www.w3.org/2003/InkML">
-  <inkml:definitions>
-    <inkml:context xml:id="ctx0">
-      <inkml:inkSource xml:id="inkSrc0">
-        <inkml:traceFormat>
-          <inkml:channel name="X" type="integer" min="-2.14748E9" max="2.14748E9" units="cm"/>
-          <inkml:channel name="Y" type="integer" min="-2.14748E9" max="2.14748E9" units="cm"/>
-          <inkml:channel name="F" type="integer" max="32767" units="dev"/>
-        </inkml:traceFormat>
-        <inkml:channelProperties>
-          <inkml:channelProperty channel="X" name="resolution" value="1000" units="1/cm"/>
-          <inkml:channelProperty channel="Y" name="resolution" value="1000" units="1/cm"/>
-          <inkml:channelProperty channel="F" name="resolution" value="0" units="1/dev"/>
-        </inkml:channelProperties>
-      </inkml:inkSource>
-      <inkml:timestamp xml:id="ts0" timeString="2022-04-05T21:35:07.373"/>
-    </inkml:context>
-    <inkml:brush xml:id="br0">
-      <inkml:brushProperty name="width" value="0.05" units="cm"/>
-      <inkml:brushProperty name="height" value="0.05" units="cm"/>
-    </inkml:brush>
-  </inkml:definitions>
-  <inkml:trace contextRef="#ctx0" brushRef="#br0">0 0 24575</inkml:trace>
-</inkml:ink>
-</file>
-
-<file path=ppt/ink/ink14.xml><?xml version="1.0" encoding="utf-8"?>
-<inkml:ink xmlns:inkml="http://www.w3.org/2003/InkML">
-  <inkml:definitions>
-    <inkml:context xml:id="ctx0">
-      <inkml:inkSource xml:id="inkSrc0">
-        <inkml:traceFormat>
-          <inkml:channel name="X" type="integer" min="-2.14748E9" max="2.14748E9" units="cm"/>
-          <inkml:channel name="Y" type="integer" min="-2.14748E9" max="2.14748E9" units="cm"/>
-          <inkml:channel name="F" type="integer" max="32767" units="dev"/>
-        </inkml:traceFormat>
-        <inkml:channelProperties>
-          <inkml:channelProperty channel="X" name="resolution" value="1000" units="1/cm"/>
-          <inkml:channelProperty channel="Y" name="resolution" value="1000" units="1/cm"/>
-          <inkml:channelProperty channel="F" name="resolution" value="0" units="1/dev"/>
-        </inkml:channelProperties>
-      </inkml:inkSource>
-      <inkml:timestamp xml:id="ts0" timeString="2022-04-05T21:35:50.925"/>
-    </inkml:context>
-    <inkml:brush xml:id="br0">
-      <inkml:brushProperty name="width" value="0.05" units="cm"/>
-      <inkml:brushProperty name="height" value="0.05" units="cm"/>
-    </inkml:brush>
-  </inkml:definitions>
-  <inkml:trace contextRef="#ctx0" brushRef="#br0">0 1 24575,'32'35'0,"45"65"0,-52-65 0,40 69 0,-54-91 0,0 1 0,1-1 0,20 16 0,3-2-1365,-22-16-5461</inkml:trace>
-</inkml:ink>
-</file>
-
-<file path=ppt/ink/ink15.xml><?xml version="1.0" encoding="utf-8"?>
-<inkml:ink xmlns:inkml="http://www.w3.org/2003/InkML">
-  <inkml:definitions>
-    <inkml:context xml:id="ctx0">
-      <inkml:inkSource xml:id="inkSrc0">
-        <inkml:traceFormat>
-          <inkml:channel name="X" type="integer" min="-2.14748E9" max="2.14748E9" units="cm"/>
-          <inkml:channel name="Y" type="integer" min="-2.14748E9" max="2.14748E9" units="cm"/>
-          <inkml:channel name="F" type="integer" max="32767" units="dev"/>
-        </inkml:traceFormat>
-        <inkml:channelProperties>
-          <inkml:channelProperty channel="X" name="resolution" value="1000" units="1/cm"/>
-          <inkml:channelProperty channel="Y" name="resolution" value="1000" units="1/cm"/>
-          <inkml:channelProperty channel="F" name="resolution" value="0" units="1/dev"/>
-        </inkml:channelProperties>
-      </inkml:inkSource>
-      <inkml:timestamp xml:id="ts0" timeString="2022-04-05T21:35:53.199"/>
-    </inkml:context>
-    <inkml:brush xml:id="br0">
-      <inkml:brushProperty name="width" value="0.05" units="cm"/>
-      <inkml:brushProperty name="height" value="0.05" units="cm"/>
-    </inkml:brush>
-  </inkml:definitions>
-  <inkml:trace contextRef="#ctx0" brushRef="#br0">265 0 24575,'-5'6'0,"1"0"0,0 0 0,0 0 0,1 0 0,0 1 0,0-1 0,0 1 0,-3 13 0,4-11 0,-2 1 0,1-1 0,-1 0 0,-9 15 0,-56 64 0,48-65 0,2 0 0,1 2 0,1 0 0,1 1 0,-15 31 0,28-46-136,0-1-1,1 1 1,0 0-1,1 0 1,0-1-1,0 1 1,1 0-1,1 0 0,1 11 1,0-3-6690</inkml:trace>
-</inkml:ink>
-</file>
-
-<file path=ppt/ink/ink2.xml><?xml version="1.0" encoding="utf-8"?>
-<inkml:ink xmlns:inkml="http://www.w3.org/2003/InkML">
-  <inkml:definitions>
-    <inkml:context xml:id="ctx0">
-      <inkml:inkSource xml:id="inkSrc0">
-        <inkml:traceFormat>
-          <inkml:channel name="X" type="integer" min="-2.14748E9" max="2.14748E9" units="cm"/>
-          <inkml:channel name="Y" type="integer" min="-2.14748E9" max="2.14748E9" units="cm"/>
-          <inkml:channel name="F" type="integer" max="32767" units="dev"/>
-        </inkml:traceFormat>
-        <inkml:channelProperties>
-          <inkml:channelProperty channel="X" name="resolution" value="1000" units="1/cm"/>
-          <inkml:channelProperty channel="Y" name="resolution" value="1000" units="1/cm"/>
-          <inkml:channelProperty channel="F" name="resolution" value="0" units="1/dev"/>
-        </inkml:channelProperties>
-      </inkml:inkSource>
-      <inkml:timestamp xml:id="ts0" timeString="2022-04-05T21:22:22.870"/>
-    </inkml:context>
-    <inkml:brush xml:id="br0">
-      <inkml:brushProperty name="width" value="0.05" units="cm"/>
-      <inkml:brushProperty name="height" value="0.05" units="cm"/>
-    </inkml:brush>
-  </inkml:definitions>
-  <inkml:trace contextRef="#ctx0" brushRef="#br0">0 427 24575,'77'-60'0,"-53"40"0,30-20 0,-46 35 0,81-56 0,-80 53 0,0-1 0,0 1 0,-1-1 0,0-1 0,0 1 0,11-20 0,2-5 0,28-35 0,-36 52 0,-10 13 0,0 1 0,1-1 0,-1 1 0,1 0 0,0 1 0,0-1 0,0 0 0,0 1 0,0 0 0,1 0 0,-1 0 0,1 1 0,-1 0 0,1 0 0,-1 0 0,1 0 0,0 0 0,0 1 0,-1 0 0,1 0 0,0 0 0,-1 1 0,10 2 0,4 1 0,1 0 0,-1 2 0,0 0 0,27 14 0,227 131 0,-166-71 0,-10-8 0,60 34-1365,-145-97-5461</inkml:trace>
-</inkml:ink>
-</file>
-
-<file path=ppt/ink/ink3.xml><?xml version="1.0" encoding="utf-8"?>
-<inkml:ink xmlns:inkml="http://www.w3.org/2003/InkML">
-  <inkml:definitions>
-    <inkml:context xml:id="ctx0">
-      <inkml:inkSource xml:id="inkSrc0">
-        <inkml:traceFormat>
-          <inkml:channel name="X" type="integer" min="-2.14748E9" max="2.14748E9" units="cm"/>
-          <inkml:channel name="Y" type="integer" min="-2.14748E9" max="2.14748E9" units="cm"/>
-          <inkml:channel name="F" type="integer" max="32767" units="dev"/>
-        </inkml:traceFormat>
-        <inkml:channelProperties>
-          <inkml:channelProperty channel="X" name="resolution" value="1000" units="1/cm"/>
-          <inkml:channelProperty channel="Y" name="resolution" value="1000" units="1/cm"/>
-          <inkml:channelProperty channel="F" name="resolution" value="0" units="1/dev"/>
-        </inkml:channelProperties>
-      </inkml:inkSource>
-      <inkml:timestamp xml:id="ts0" timeString="2022-04-05T21:22:28.613"/>
-    </inkml:context>
-    <inkml:brush xml:id="br0">
-      <inkml:brushProperty name="width" value="0.05" units="cm"/>
-      <inkml:brushProperty name="height" value="0.05" units="cm"/>
-    </inkml:brush>
-  </inkml:definitions>
-  <inkml:trace contextRef="#ctx0" brushRef="#br0">1 1 24575,'0'0'-8191</inkml:trace>
-</inkml:ink>
-</file>
-
-<file path=ppt/ink/ink4.xml><?xml version="1.0" encoding="utf-8"?>
-<inkml:ink xmlns:inkml="http://www.w3.org/2003/InkML">
-  <inkml:definitions>
-    <inkml:context xml:id="ctx0">
-      <inkml:inkSource xml:id="inkSrc0">
-        <inkml:traceFormat>
-          <inkml:channel name="X" type="integer" min="-2.14748E9" max="2.14748E9" units="cm"/>
-          <inkml:channel name="Y" type="integer" min="-2.14748E9" max="2.14748E9" units="cm"/>
-          <inkml:channel name="F" type="integer" max="32767" units="dev"/>
-        </inkml:traceFormat>
-        <inkml:channelProperties>
-          <inkml:channelProperty channel="X" name="resolution" value="1000" units="1/cm"/>
-          <inkml:channelProperty channel="Y" name="resolution" value="1000" units="1/cm"/>
-          <inkml:channelProperty channel="F" name="resolution" value="0" units="1/dev"/>
-        </inkml:channelProperties>
-      </inkml:inkSource>
-      <inkml:timestamp xml:id="ts0" timeString="2022-04-05T21:28:32.983"/>
-    </inkml:context>
-    <inkml:brush xml:id="br0">
-      <inkml:brushProperty name="width" value="0.05" units="cm"/>
-      <inkml:brushProperty name="height" value="0.05" units="cm"/>
-    </inkml:brush>
-  </inkml:definitions>
-  <inkml:trace contextRef="#ctx0" brushRef="#br0">1 1 24575,'0'0'-8191</inkml:trace>
-</inkml:ink>
-</file>
-
-<file path=ppt/ink/ink5.xml><?xml version="1.0" encoding="utf-8"?>
-<inkml:ink xmlns:inkml="http://www.w3.org/2003/InkML">
-  <inkml:definitions>
-    <inkml:context xml:id="ctx0">
-      <inkml:inkSource xml:id="inkSrc0">
-        <inkml:traceFormat>
-          <inkml:channel name="X" type="integer" min="-2.14748E9" max="2.14748E9" units="cm"/>
-          <inkml:channel name="Y" type="integer" min="-2.14748E9" max="2.14748E9" units="cm"/>
-          <inkml:channel name="F" type="integer" max="32767" units="dev"/>
-        </inkml:traceFormat>
-        <inkml:channelProperties>
-          <inkml:channelProperty channel="X" name="resolution" value="1000" units="1/cm"/>
-          <inkml:channelProperty channel="Y" name="resolution" value="1000" units="1/cm"/>
-          <inkml:channelProperty channel="F" name="resolution" value="0" units="1/dev"/>
-        </inkml:channelProperties>
-      </inkml:inkSource>
-      <inkml:timestamp xml:id="ts0" timeString="2022-04-05T21:28:34.068"/>
-    </inkml:context>
-    <inkml:brush xml:id="br0">
-      <inkml:brushProperty name="width" value="0.05" units="cm"/>
-      <inkml:brushProperty name="height" value="0.05" units="cm"/>
-    </inkml:brush>
-  </inkml:definitions>
-  <inkml:trace contextRef="#ctx0" brushRef="#br0">0 1 24575,'0'0'-8191</inkml:trace>
-</inkml:ink>
-</file>
-
-<file path=ppt/ink/ink6.xml><?xml version="1.0" encoding="utf-8"?>
-<inkml:ink xmlns:inkml="http://www.w3.org/2003/InkML">
-  <inkml:definitions>
-    <inkml:context xml:id="ctx0">
-      <inkml:inkSource xml:id="inkSrc0">
-        <inkml:traceFormat>
-          <inkml:channel name="X" type="integer" min="-2.14748E9" max="2.14748E9" units="cm"/>
-          <inkml:channel name="Y" type="integer" min="-2.14748E9" max="2.14748E9" units="cm"/>
-          <inkml:channel name="F" type="integer" max="32767" units="dev"/>
-        </inkml:traceFormat>
-        <inkml:channelProperties>
-          <inkml:channelProperty channel="X" name="resolution" value="1000" units="1/cm"/>
-          <inkml:channelProperty channel="Y" name="resolution" value="1000" units="1/cm"/>
-          <inkml:channelProperty channel="F" name="resolution" value="0" units="1/dev"/>
-        </inkml:channelProperties>
-      </inkml:inkSource>
-      <inkml:timestamp xml:id="ts0" timeString="2022-04-05T21:28:35.104"/>
-    </inkml:context>
-    <inkml:brush xml:id="br0">
-      <inkml:brushProperty name="width" value="0.05" units="cm"/>
-      <inkml:brushProperty name="height" value="0.05" units="cm"/>
-    </inkml:brush>
-  </inkml:definitions>
-  <inkml:trace contextRef="#ctx0" brushRef="#br0">0 1 24575,'0'0'-8191</inkml:trace>
-</inkml:ink>
-</file>
-
-<file path=ppt/ink/ink7.xml><?xml version="1.0" encoding="utf-8"?>
-<inkml:ink xmlns:inkml="http://www.w3.org/2003/InkML">
-  <inkml:definitions>
-    <inkml:context xml:id="ctx0">
-      <inkml:inkSource xml:id="inkSrc0">
-        <inkml:traceFormat>
-          <inkml:channel name="X" type="integer" min="-2.14748E9" max="2.14748E9" units="cm"/>
-          <inkml:channel name="Y" type="integer" min="-2.14748E9" max="2.14748E9" units="cm"/>
-          <inkml:channel name="F" type="integer" max="32767" units="dev"/>
-        </inkml:traceFormat>
-        <inkml:channelProperties>
-          <inkml:channelProperty channel="X" name="resolution" value="1000" units="1/cm"/>
-          <inkml:channelProperty channel="Y" name="resolution" value="1000" units="1/cm"/>
-          <inkml:channelProperty channel="F" name="resolution" value="0" units="1/dev"/>
-        </inkml:channelProperties>
-      </inkml:inkSource>
-      <inkml:timestamp xml:id="ts0" timeString="2022-04-05T21:28:36.225"/>
-    </inkml:context>
-    <inkml:brush xml:id="br0">
-      <inkml:brushProperty name="width" value="0.05" units="cm"/>
-      <inkml:brushProperty name="height" value="0.05" units="cm"/>
-    </inkml:brush>
-  </inkml:definitions>
-  <inkml:trace contextRef="#ctx0" brushRef="#br0">1 0 24575,'0'0'-8191</inkml:trace>
-</inkml:ink>
-</file>
-
-<file path=ppt/ink/ink8.xml><?xml version="1.0" encoding="utf-8"?>
-<inkml:ink xmlns:inkml="http://www.w3.org/2003/InkML">
-  <inkml:definitions>
-    <inkml:context xml:id="ctx0">
-      <inkml:inkSource xml:id="inkSrc0">
-        <inkml:traceFormat>
-          <inkml:channel name="X" type="integer" min="-2.14748E9" max="2.14748E9" units="cm"/>
-          <inkml:channel name="Y" type="integer" min="-2.14748E9" max="2.14748E9" units="cm"/>
-          <inkml:channel name="F" type="integer" max="32767" units="dev"/>
-        </inkml:traceFormat>
-        <inkml:channelProperties>
-          <inkml:channelProperty channel="X" name="resolution" value="1000" units="1/cm"/>
-          <inkml:channelProperty channel="Y" name="resolution" value="1000" units="1/cm"/>
-          <inkml:channelProperty channel="F" name="resolution" value="0" units="1/dev"/>
-        </inkml:channelProperties>
-      </inkml:inkSource>
-      <inkml:timestamp xml:id="ts0" timeString="2022-04-05T21:35:04.142"/>
-    </inkml:context>
-    <inkml:brush xml:id="br0">
-      <inkml:brushProperty name="width" value="0.05" units="cm"/>
-      <inkml:brushProperty name="height" value="0.05" units="cm"/>
-    </inkml:brush>
-  </inkml:definitions>
-  <inkml:trace contextRef="#ctx0" brushRef="#br0">0 0 24575,'0'0'-8191</inkml:trace>
-</inkml:ink>
-</file>
-
-<file path=ppt/ink/ink9.xml><?xml version="1.0" encoding="utf-8"?>
-<inkml:ink xmlns:inkml="http://www.w3.org/2003/InkML">
-  <inkml:definitions>
-    <inkml:context xml:id="ctx0">
-      <inkml:inkSource xml:id="inkSrc0">
-        <inkml:traceFormat>
-          <inkml:channel name="X" type="integer" min="-2.14748E9" max="2.14748E9" units="cm"/>
-          <inkml:channel name="Y" type="integer" min="-2.14748E9" max="2.14748E9" units="cm"/>
-          <inkml:channel name="F" type="integer" max="32767" units="dev"/>
-        </inkml:traceFormat>
-        <inkml:channelProperties>
-          <inkml:channelProperty channel="X" name="resolution" value="1000" units="1/cm"/>
-          <inkml:channelProperty channel="Y" name="resolution" value="1000" units="1/cm"/>
-          <inkml:channelProperty channel="F" name="resolution" value="0" units="1/dev"/>
-        </inkml:channelProperties>
-      </inkml:inkSource>
-      <inkml:timestamp xml:id="ts0" timeString="2022-04-05T21:35:04.745"/>
-    </inkml:context>
-    <inkml:brush xml:id="br0">
-      <inkml:brushProperty name="width" value="0.05" units="cm"/>
-      <inkml:brushProperty name="height" value="0.05" units="cm"/>
-    </inkml:brush>
-  </inkml:definitions>
-  <inkml:trace contextRef="#ctx0" brushRef="#br0">0 0 24575,'0'0'-8191</inkml:trace>
-</inkml:ink>
-</file>
-
 <file path=ppt/notesMasters/notesMaster1.xml><?xml version="1.0" encoding="utf-8"?>
 <p:notesMaster xmlns:a="http://schemas.openxmlformats.org/drawingml/2006/main" xmlns:r="http://schemas.openxmlformats.org/officeDocument/2006/relationships" xmlns:p="http://schemas.openxmlformats.org/presentationml/2006/main">
   <p:cSld>
@@ -616,7 +211,7 @@
           <a:p>
             <a:fld id="{F7298459-DA96-4902-875B-6A81057DCB5E}" type="datetimeFigureOut">
               <a:rPr lang="en-US" smtClean="0"/>
-              <a:t>4/5/2022</a:t>
+              <a:t>4/6/2022</a:t>
             </a:fld>
             <a:endParaRPr lang="en-US"/>
           </a:p>
@@ -1034,7 +629,7 @@
           <a:p>
             <a:fld id="{BFCF14C1-5744-4145-91AD-5AD43B56F812}" type="datetimeFigureOut">
               <a:rPr lang="en-US" smtClean="0"/>
-              <a:t>4/5/2022</a:t>
+              <a:t>4/6/2022</a:t>
             </a:fld>
             <a:endParaRPr lang="en-US"/>
           </a:p>
@@ -1232,7 +827,7 @@
           <a:p>
             <a:fld id="{BFCF14C1-5744-4145-91AD-5AD43B56F812}" type="datetimeFigureOut">
               <a:rPr lang="en-US" smtClean="0"/>
-              <a:t>4/5/2022</a:t>
+              <a:t>4/6/2022</a:t>
             </a:fld>
             <a:endParaRPr lang="en-US"/>
           </a:p>
@@ -1440,7 +1035,7 @@
           <a:p>
             <a:fld id="{BFCF14C1-5744-4145-91AD-5AD43B56F812}" type="datetimeFigureOut">
               <a:rPr lang="en-US" smtClean="0"/>
-              <a:t>4/5/2022</a:t>
+              <a:t>4/6/2022</a:t>
             </a:fld>
             <a:endParaRPr lang="en-US"/>
           </a:p>
@@ -1670,7 +1265,7 @@
           <a:p>
             <a:fld id="{BFCF14C1-5744-4145-91AD-5AD43B56F812}" type="datetimeFigureOut">
               <a:rPr lang="en-US" smtClean="0"/>
-              <a:t>4/5/2022</a:t>
+              <a:t>4/6/2022</a:t>
             </a:fld>
             <a:endParaRPr lang="en-US"/>
           </a:p>
@@ -1945,7 +1540,7 @@
           <a:p>
             <a:fld id="{BFCF14C1-5744-4145-91AD-5AD43B56F812}" type="datetimeFigureOut">
               <a:rPr lang="en-US" smtClean="0"/>
-              <a:t>4/5/2022</a:t>
+              <a:t>4/6/2022</a:t>
             </a:fld>
             <a:endParaRPr lang="en-US"/>
           </a:p>
@@ -2210,7 +1805,7 @@
           <a:p>
             <a:fld id="{BFCF14C1-5744-4145-91AD-5AD43B56F812}" type="datetimeFigureOut">
               <a:rPr lang="en-US" smtClean="0"/>
-              <a:t>4/5/2022</a:t>
+              <a:t>4/6/2022</a:t>
             </a:fld>
             <a:endParaRPr lang="en-US"/>
           </a:p>
@@ -2622,7 +2217,7 @@
           <a:p>
             <a:fld id="{BFCF14C1-5744-4145-91AD-5AD43B56F812}" type="datetimeFigureOut">
               <a:rPr lang="en-US" smtClean="0"/>
-              <a:t>4/5/2022</a:t>
+              <a:t>4/6/2022</a:t>
             </a:fld>
             <a:endParaRPr lang="en-US"/>
           </a:p>
@@ -2763,7 +2358,7 @@
           <a:p>
             <a:fld id="{BFCF14C1-5744-4145-91AD-5AD43B56F812}" type="datetimeFigureOut">
               <a:rPr lang="en-US" smtClean="0"/>
-              <a:t>4/5/2022</a:t>
+              <a:t>4/6/2022</a:t>
             </a:fld>
             <a:endParaRPr lang="en-US"/>
           </a:p>
@@ -2876,7 +2471,7 @@
           <a:p>
             <a:fld id="{BFCF14C1-5744-4145-91AD-5AD43B56F812}" type="datetimeFigureOut">
               <a:rPr lang="en-US" smtClean="0"/>
-              <a:t>4/5/2022</a:t>
+              <a:t>4/6/2022</a:t>
             </a:fld>
             <a:endParaRPr lang="en-US"/>
           </a:p>
@@ -3187,7 +2782,7 @@
           <a:p>
             <a:fld id="{BFCF14C1-5744-4145-91AD-5AD43B56F812}" type="datetimeFigureOut">
               <a:rPr lang="en-US" smtClean="0"/>
-              <a:t>4/5/2022</a:t>
+              <a:t>4/6/2022</a:t>
             </a:fld>
             <a:endParaRPr lang="en-US"/>
           </a:p>
@@ -3475,7 +3070,7 @@
           <a:p>
             <a:fld id="{BFCF14C1-5744-4145-91AD-5AD43B56F812}" type="datetimeFigureOut">
               <a:rPr lang="en-US" smtClean="0"/>
-              <a:t>4/5/2022</a:t>
+              <a:t>4/6/2022</a:t>
             </a:fld>
             <a:endParaRPr lang="en-US"/>
           </a:p>
@@ -3735,7 +3330,7 @@
           <a:p>
             <a:fld id="{BFCF14C1-5744-4145-91AD-5AD43B56F812}" type="datetimeFigureOut">
               <a:rPr lang="en-US" smtClean="0"/>
-              <a:t>4/5/2022</a:t>
+              <a:t>4/6/2022</a:t>
             </a:fld>
             <a:endParaRPr lang="en-US"/>
           </a:p>
@@ -6003,3371 +5598,68 @@
       </p:grpSpPr>
       <p:sp>
         <p:nvSpPr>
-          <p:cNvPr id="5" name="Rectangle 4">
-            <a:extLst>
-              <a:ext uri="{FF2B5EF4-FFF2-40B4-BE49-F238E27FC236}">
-                <a16:creationId xmlns:a16="http://schemas.microsoft.com/office/drawing/2014/main" id="{211EF20B-AB5C-4687-A223-764B9CDAE1D3}"/>
-              </a:ext>
-            </a:extLst>
-          </p:cNvPr>
-          <p:cNvSpPr/>
-          <p:nvPr/>
+          <p:cNvPr id="2" name="Title 1">
+            <a:extLst>
+              <a:ext uri="{FF2B5EF4-FFF2-40B4-BE49-F238E27FC236}">
+                <a16:creationId xmlns:a16="http://schemas.microsoft.com/office/drawing/2014/main" id="{449571F1-5E58-4596-B6EC-5DCF0831A5C6}"/>
+              </a:ext>
+            </a:extLst>
+          </p:cNvPr>
+          <p:cNvSpPr>
+            <a:spLocks noGrp="1"/>
+          </p:cNvSpPr>
+          <p:nvPr>
+            <p:ph type="title"/>
+          </p:nvPr>
         </p:nvSpPr>
+        <p:spPr/>
+        <p:txBody>
+          <a:bodyPr/>
+          <a:lstStyle/>
+          <a:p>
+            <a:endParaRPr lang="en-US"/>
+          </a:p>
+        </p:txBody>
+      </p:sp>
+      <p:pic>
+        <p:nvPicPr>
+          <p:cNvPr id="5" name="Content Placeholder 4" descr="Diagram&#10;&#10;Description automatically generated">
+            <a:extLst>
+              <a:ext uri="{FF2B5EF4-FFF2-40B4-BE49-F238E27FC236}">
+                <a16:creationId xmlns:a16="http://schemas.microsoft.com/office/drawing/2014/main" id="{483D686C-DFD2-419A-B184-9F981731F5B2}"/>
+              </a:ext>
+            </a:extLst>
+          </p:cNvPr>
+          <p:cNvPicPr>
+            <a:picLocks noGrp="1" noChangeAspect="1"/>
+          </p:cNvPicPr>
+          <p:nvPr>
+            <p:ph idx="1"/>
+          </p:nvPr>
+        </p:nvPicPr>
+        <p:blipFill>
+          <a:blip r:embed="rId2">
+            <a:extLst>
+              <a:ext uri="{28A0092B-C50C-407E-A947-70E740481C1C}">
+                <a14:useLocalDpi xmlns:a14="http://schemas.microsoft.com/office/drawing/2010/main" val="0"/>
+              </a:ext>
+            </a:extLst>
+          </a:blip>
+          <a:stretch>
+            <a:fillRect/>
+          </a:stretch>
+        </p:blipFill>
         <p:spPr>
           <a:xfrm>
-            <a:off x="1163782" y="2396836"/>
-            <a:ext cx="2198254" cy="544946"/>
+            <a:off x="1036005" y="365125"/>
+            <a:ext cx="10119990" cy="6294141"/>
           </a:xfrm>
-          <a:prstGeom prst="rect">
-            <a:avLst/>
-          </a:prstGeom>
-          <a:solidFill>
-            <a:schemeClr val="tx2"/>
-          </a:solidFill>
         </p:spPr>
-        <p:style>
-          <a:lnRef idx="2">
-            <a:schemeClr val="accent1">
-              <a:shade val="50000"/>
-            </a:schemeClr>
-          </a:lnRef>
-          <a:fillRef idx="1">
-            <a:schemeClr val="accent1"/>
-          </a:fillRef>
-          <a:effectRef idx="0">
-            <a:schemeClr val="accent1"/>
-          </a:effectRef>
-          <a:fontRef idx="minor">
-            <a:schemeClr val="lt1"/>
-          </a:fontRef>
-        </p:style>
-        <p:txBody>
-          <a:bodyPr rtlCol="0" anchor="ctr"/>
-          <a:lstStyle/>
-          <a:p>
-            <a:pPr algn="ctr"/>
-            <a:r>
-              <a:rPr lang="en-US" dirty="0">
-                <a:latin typeface="Consolas" panose="020B0609020204030204" pitchFamily="49" charset="0"/>
-              </a:rPr>
-              <a:t>Forum</a:t>
-            </a:r>
-          </a:p>
-        </p:txBody>
-      </p:sp>
-      <p:sp>
-        <p:nvSpPr>
-          <p:cNvPr id="6" name="Rectangle 5">
-            <a:extLst>
-              <a:ext uri="{FF2B5EF4-FFF2-40B4-BE49-F238E27FC236}">
-                <a16:creationId xmlns:a16="http://schemas.microsoft.com/office/drawing/2014/main" id="{6104A6C8-A545-418A-91A0-F9F774FB5823}"/>
-              </a:ext>
-            </a:extLst>
-          </p:cNvPr>
-          <p:cNvSpPr/>
-          <p:nvPr/>
-        </p:nvSpPr>
-        <p:spPr>
-          <a:xfrm>
-            <a:off x="8358722" y="3817379"/>
-            <a:ext cx="2198254" cy="544946"/>
-          </a:xfrm>
-          <a:prstGeom prst="rect">
-            <a:avLst/>
-          </a:prstGeom>
-          <a:solidFill>
-            <a:schemeClr val="tx2"/>
-          </a:solidFill>
-        </p:spPr>
-        <p:style>
-          <a:lnRef idx="2">
-            <a:schemeClr val="accent1">
-              <a:shade val="50000"/>
-            </a:schemeClr>
-          </a:lnRef>
-          <a:fillRef idx="1">
-            <a:schemeClr val="accent1"/>
-          </a:fillRef>
-          <a:effectRef idx="0">
-            <a:schemeClr val="accent1"/>
-          </a:effectRef>
-          <a:fontRef idx="minor">
-            <a:schemeClr val="lt1"/>
-          </a:fontRef>
-        </p:style>
-        <p:txBody>
-          <a:bodyPr rtlCol="0" anchor="ctr"/>
-          <a:lstStyle/>
-          <a:p>
-            <a:pPr algn="ctr"/>
-            <a:r>
-              <a:rPr lang="en-US" dirty="0"/>
-              <a:t>Owner</a:t>
-            </a:r>
-          </a:p>
-        </p:txBody>
-      </p:sp>
-      <p:sp>
-        <p:nvSpPr>
-          <p:cNvPr id="7" name="Rectangle 6">
-            <a:extLst>
-              <a:ext uri="{FF2B5EF4-FFF2-40B4-BE49-F238E27FC236}">
-                <a16:creationId xmlns:a16="http://schemas.microsoft.com/office/drawing/2014/main" id="{E3E89AAA-C600-4E2D-9AEA-61DBA30BFE98}"/>
-              </a:ext>
-            </a:extLst>
-          </p:cNvPr>
-          <p:cNvSpPr/>
-          <p:nvPr/>
-        </p:nvSpPr>
-        <p:spPr>
-          <a:xfrm>
-            <a:off x="5881244" y="3272433"/>
-            <a:ext cx="2198254" cy="544946"/>
-          </a:xfrm>
-          <a:prstGeom prst="rect">
-            <a:avLst/>
-          </a:prstGeom>
-          <a:solidFill>
-            <a:schemeClr val="tx2"/>
-          </a:solidFill>
-        </p:spPr>
-        <p:style>
-          <a:lnRef idx="2">
-            <a:schemeClr val="accent1">
-              <a:shade val="50000"/>
-            </a:schemeClr>
-          </a:lnRef>
-          <a:fillRef idx="1">
-            <a:schemeClr val="accent1"/>
-          </a:fillRef>
-          <a:effectRef idx="0">
-            <a:schemeClr val="accent1"/>
-          </a:effectRef>
-          <a:fontRef idx="minor">
-            <a:schemeClr val="lt1"/>
-          </a:fontRef>
-        </p:style>
-        <p:txBody>
-          <a:bodyPr rtlCol="0" anchor="ctr"/>
-          <a:lstStyle/>
-          <a:p>
-            <a:pPr algn="ctr"/>
-            <a:r>
-              <a:rPr lang="en-US" dirty="0"/>
-              <a:t>Moderator</a:t>
-            </a:r>
-          </a:p>
-        </p:txBody>
-      </p:sp>
-      <p:sp>
-        <p:nvSpPr>
-          <p:cNvPr id="8" name="Rectangle 7">
-            <a:extLst>
-              <a:ext uri="{FF2B5EF4-FFF2-40B4-BE49-F238E27FC236}">
-                <a16:creationId xmlns:a16="http://schemas.microsoft.com/office/drawing/2014/main" id="{D0DB08B8-D680-446B-97C0-D2E7E949242C}"/>
-              </a:ext>
-            </a:extLst>
-          </p:cNvPr>
-          <p:cNvSpPr/>
-          <p:nvPr/>
-        </p:nvSpPr>
-        <p:spPr>
-          <a:xfrm>
-            <a:off x="573397" y="4647583"/>
-            <a:ext cx="2198254" cy="544946"/>
-          </a:xfrm>
-          <a:prstGeom prst="rect">
-            <a:avLst/>
-          </a:prstGeom>
-          <a:solidFill>
-            <a:schemeClr val="tx2"/>
-          </a:solidFill>
-        </p:spPr>
-        <p:style>
-          <a:lnRef idx="2">
-            <a:schemeClr val="accent1">
-              <a:shade val="50000"/>
-            </a:schemeClr>
-          </a:lnRef>
-          <a:fillRef idx="1">
-            <a:schemeClr val="accent1"/>
-          </a:fillRef>
-          <a:effectRef idx="0">
-            <a:schemeClr val="accent1"/>
-          </a:effectRef>
-          <a:fontRef idx="minor">
-            <a:schemeClr val="lt1"/>
-          </a:fontRef>
-        </p:style>
-        <p:txBody>
-          <a:bodyPr rtlCol="0" anchor="ctr"/>
-          <a:lstStyle/>
-          <a:p>
-            <a:pPr algn="ctr"/>
-            <a:r>
-              <a:rPr lang="en-US" dirty="0"/>
-              <a:t>DiscussionThread</a:t>
-            </a:r>
-          </a:p>
-        </p:txBody>
-      </p:sp>
-      <p:sp>
-        <p:nvSpPr>
-          <p:cNvPr id="9" name="Rectangle 8">
-            <a:extLst>
-              <a:ext uri="{FF2B5EF4-FFF2-40B4-BE49-F238E27FC236}">
-                <a16:creationId xmlns:a16="http://schemas.microsoft.com/office/drawing/2014/main" id="{3514D583-211F-4F2F-8FB5-3BF896111415}"/>
-              </a:ext>
-            </a:extLst>
-          </p:cNvPr>
-          <p:cNvSpPr/>
-          <p:nvPr/>
-        </p:nvSpPr>
-        <p:spPr>
-          <a:xfrm>
-            <a:off x="3692233" y="6147795"/>
-            <a:ext cx="2369127" cy="544946"/>
-          </a:xfrm>
-          <a:prstGeom prst="rect">
-            <a:avLst/>
-          </a:prstGeom>
-          <a:solidFill>
-            <a:schemeClr val="tx2"/>
-          </a:solidFill>
-        </p:spPr>
-        <p:style>
-          <a:lnRef idx="2">
-            <a:schemeClr val="accent1">
-              <a:shade val="50000"/>
-            </a:schemeClr>
-          </a:lnRef>
-          <a:fillRef idx="1">
-            <a:schemeClr val="accent1"/>
-          </a:fillRef>
-          <a:effectRef idx="0">
-            <a:schemeClr val="accent1"/>
-          </a:effectRef>
-          <a:fontRef idx="minor">
-            <a:schemeClr val="lt1"/>
-          </a:fontRef>
-        </p:style>
-        <p:txBody>
-          <a:bodyPr rtlCol="0" anchor="ctr"/>
-          <a:lstStyle/>
-          <a:p>
-            <a:pPr algn="ctr"/>
-            <a:r>
-              <a:rPr lang="en-US" dirty="0" err="1"/>
-              <a:t>InitiatingMessage</a:t>
-            </a:r>
-            <a:endParaRPr lang="en-US" dirty="0"/>
-          </a:p>
-        </p:txBody>
-      </p:sp>
-      <p:sp>
-        <p:nvSpPr>
-          <p:cNvPr id="10" name="Rectangle 9">
-            <a:extLst>
-              <a:ext uri="{FF2B5EF4-FFF2-40B4-BE49-F238E27FC236}">
-                <a16:creationId xmlns:a16="http://schemas.microsoft.com/office/drawing/2014/main" id="{A84E1037-E52D-4E6B-82BE-BA1E27ABFC13}"/>
-              </a:ext>
-            </a:extLst>
-          </p:cNvPr>
-          <p:cNvSpPr/>
-          <p:nvPr/>
-        </p:nvSpPr>
-        <p:spPr>
-          <a:xfrm>
-            <a:off x="5100778" y="4647583"/>
-            <a:ext cx="2198254" cy="544946"/>
-          </a:xfrm>
-          <a:prstGeom prst="rect">
-            <a:avLst/>
-          </a:prstGeom>
-          <a:solidFill>
-            <a:schemeClr val="tx2"/>
-          </a:solidFill>
-        </p:spPr>
-        <p:style>
-          <a:lnRef idx="2">
-            <a:schemeClr val="accent1">
-              <a:shade val="50000"/>
-            </a:schemeClr>
-          </a:lnRef>
-          <a:fillRef idx="1">
-            <a:schemeClr val="accent1"/>
-          </a:fillRef>
-          <a:effectRef idx="0">
-            <a:schemeClr val="accent1"/>
-          </a:effectRef>
-          <a:fontRef idx="minor">
-            <a:schemeClr val="lt1"/>
-          </a:fontRef>
-        </p:style>
-        <p:txBody>
-          <a:bodyPr rtlCol="0" anchor="ctr"/>
-          <a:lstStyle/>
-          <a:p>
-            <a:pPr algn="ctr"/>
-            <a:r>
-              <a:rPr lang="en-US" dirty="0"/>
-              <a:t>&lt;&lt;abstract&gt;&gt;</a:t>
-            </a:r>
-          </a:p>
-          <a:p>
-            <a:pPr algn="ctr"/>
-            <a:r>
-              <a:rPr lang="en-US" i="1" dirty="0"/>
-              <a:t>Message</a:t>
-            </a:r>
-          </a:p>
-        </p:txBody>
-      </p:sp>
-      <p:sp>
-        <p:nvSpPr>
-          <p:cNvPr id="11" name="Rectangle 10">
-            <a:extLst>
-              <a:ext uri="{FF2B5EF4-FFF2-40B4-BE49-F238E27FC236}">
-                <a16:creationId xmlns:a16="http://schemas.microsoft.com/office/drawing/2014/main" id="{01A4683B-A2C0-4DB9-81D7-93AA64AC36ED}"/>
-              </a:ext>
-            </a:extLst>
-          </p:cNvPr>
-          <p:cNvSpPr/>
-          <p:nvPr/>
-        </p:nvSpPr>
-        <p:spPr>
-          <a:xfrm>
-            <a:off x="6458529" y="6147795"/>
-            <a:ext cx="2198254" cy="544946"/>
-          </a:xfrm>
-          <a:prstGeom prst="rect">
-            <a:avLst/>
-          </a:prstGeom>
-          <a:solidFill>
-            <a:schemeClr val="tx2"/>
-          </a:solidFill>
-        </p:spPr>
-        <p:style>
-          <a:lnRef idx="2">
-            <a:schemeClr val="accent1">
-              <a:shade val="50000"/>
-            </a:schemeClr>
-          </a:lnRef>
-          <a:fillRef idx="1">
-            <a:schemeClr val="accent1"/>
-          </a:fillRef>
-          <a:effectRef idx="0">
-            <a:schemeClr val="accent1"/>
-          </a:effectRef>
-          <a:fontRef idx="minor">
-            <a:schemeClr val="lt1"/>
-          </a:fontRef>
-        </p:style>
-        <p:txBody>
-          <a:bodyPr rtlCol="0" anchor="ctr"/>
-          <a:lstStyle/>
-          <a:p>
-            <a:pPr algn="ctr"/>
-            <a:r>
-              <a:rPr lang="en-US" dirty="0"/>
-              <a:t>ReplyMessage</a:t>
-            </a:r>
-          </a:p>
-        </p:txBody>
-      </p:sp>
-      <p:sp>
-        <p:nvSpPr>
-          <p:cNvPr id="12" name="Rectangle 11">
-            <a:extLst>
-              <a:ext uri="{FF2B5EF4-FFF2-40B4-BE49-F238E27FC236}">
-                <a16:creationId xmlns:a16="http://schemas.microsoft.com/office/drawing/2014/main" id="{8DDAEE59-12EE-400E-8F4B-44BDD3E2EFBD}"/>
-              </a:ext>
-            </a:extLst>
-          </p:cNvPr>
-          <p:cNvSpPr/>
-          <p:nvPr/>
-        </p:nvSpPr>
-        <p:spPr>
-          <a:xfrm>
-            <a:off x="6828518" y="1548495"/>
-            <a:ext cx="2716087" cy="544946"/>
-          </a:xfrm>
-          <a:prstGeom prst="rect">
-            <a:avLst/>
-          </a:prstGeom>
-          <a:solidFill>
-            <a:schemeClr val="tx2"/>
-          </a:solidFill>
-        </p:spPr>
-        <p:style>
-          <a:lnRef idx="2">
-            <a:schemeClr val="accent1">
-              <a:shade val="50000"/>
-            </a:schemeClr>
-          </a:lnRef>
-          <a:fillRef idx="1">
-            <a:schemeClr val="accent1"/>
-          </a:fillRef>
-          <a:effectRef idx="0">
-            <a:schemeClr val="accent1"/>
-          </a:effectRef>
-          <a:fontRef idx="minor">
-            <a:schemeClr val="lt1"/>
-          </a:fontRef>
-        </p:style>
-        <p:txBody>
-          <a:bodyPr rtlCol="0" anchor="ctr"/>
-          <a:lstStyle/>
-          <a:p>
-            <a:pPr algn="ctr"/>
-            <a:r>
-              <a:rPr lang="en-US" dirty="0"/>
-              <a:t>Member</a:t>
-            </a:r>
-          </a:p>
-        </p:txBody>
-      </p:sp>
-      <p:sp>
-        <p:nvSpPr>
-          <p:cNvPr id="13" name="Rectangle 12">
-            <a:extLst>
-              <a:ext uri="{FF2B5EF4-FFF2-40B4-BE49-F238E27FC236}">
-                <a16:creationId xmlns:a16="http://schemas.microsoft.com/office/drawing/2014/main" id="{C436CDE8-1DC1-4C49-91DA-A4064D6840D0}"/>
-              </a:ext>
-            </a:extLst>
-          </p:cNvPr>
-          <p:cNvSpPr/>
-          <p:nvPr/>
-        </p:nvSpPr>
-        <p:spPr>
-          <a:xfrm>
-            <a:off x="5407893" y="461817"/>
-            <a:ext cx="2198254" cy="544946"/>
-          </a:xfrm>
-          <a:prstGeom prst="rect">
-            <a:avLst/>
-          </a:prstGeom>
-          <a:solidFill>
-            <a:schemeClr val="tx2"/>
-          </a:solidFill>
-        </p:spPr>
-        <p:style>
-          <a:lnRef idx="2">
-            <a:schemeClr val="accent1">
-              <a:shade val="50000"/>
-            </a:schemeClr>
-          </a:lnRef>
-          <a:fillRef idx="1">
-            <a:schemeClr val="accent1"/>
-          </a:fillRef>
-          <a:effectRef idx="0">
-            <a:schemeClr val="accent1"/>
-          </a:effectRef>
-          <a:fontRef idx="minor">
-            <a:schemeClr val="lt1"/>
-          </a:fontRef>
-        </p:style>
-        <p:txBody>
-          <a:bodyPr rtlCol="0" anchor="ctr"/>
-          <a:lstStyle/>
-          <a:p>
-            <a:pPr algn="ctr"/>
-            <a:r>
-              <a:rPr lang="en-US" dirty="0"/>
-              <a:t>User</a:t>
-            </a:r>
-          </a:p>
-        </p:txBody>
-      </p:sp>
-      <p:sp>
-        <p:nvSpPr>
-          <p:cNvPr id="15" name="Isosceles Triangle 14">
-            <a:extLst>
-              <a:ext uri="{FF2B5EF4-FFF2-40B4-BE49-F238E27FC236}">
-                <a16:creationId xmlns:a16="http://schemas.microsoft.com/office/drawing/2014/main" id="{7388143F-4253-4DC6-8EE2-5C73505C1DAF}"/>
-              </a:ext>
-            </a:extLst>
-          </p:cNvPr>
-          <p:cNvSpPr/>
-          <p:nvPr/>
-        </p:nvSpPr>
-        <p:spPr>
-          <a:xfrm>
-            <a:off x="5252769" y="5192529"/>
-            <a:ext cx="325994" cy="211342"/>
-          </a:xfrm>
-          <a:prstGeom prst="triangle">
-            <a:avLst/>
-          </a:prstGeom>
-          <a:noFill/>
-          <a:ln w="19050" cap="flat" cmpd="sng" algn="ctr">
-            <a:solidFill>
-              <a:schemeClr val="dk1"/>
-            </a:solidFill>
-            <a:prstDash val="solid"/>
-            <a:round/>
-            <a:headEnd type="none" w="med" len="med"/>
-            <a:tailEnd type="none" w="med" len="med"/>
-          </a:ln>
-        </p:spPr>
-        <p:style>
-          <a:lnRef idx="0">
-            <a:scrgbClr r="0" g="0" b="0"/>
-          </a:lnRef>
-          <a:fillRef idx="0">
-            <a:scrgbClr r="0" g="0" b="0"/>
-          </a:fillRef>
-          <a:effectRef idx="0">
-            <a:scrgbClr r="0" g="0" b="0"/>
-          </a:effectRef>
-          <a:fontRef idx="minor">
-            <a:schemeClr val="dk1"/>
-          </a:fontRef>
-        </p:style>
-        <p:txBody>
-          <a:bodyPr rtlCol="0" anchor="ctr"/>
-          <a:lstStyle/>
-          <a:p>
-            <a:pPr algn="ctr"/>
-            <a:endParaRPr lang="en-US"/>
-          </a:p>
-        </p:txBody>
-      </p:sp>
-      <p:sp>
-        <p:nvSpPr>
-          <p:cNvPr id="20" name="Isosceles Triangle 19">
-            <a:extLst>
-              <a:ext uri="{FF2B5EF4-FFF2-40B4-BE49-F238E27FC236}">
-                <a16:creationId xmlns:a16="http://schemas.microsoft.com/office/drawing/2014/main" id="{FD48E14E-F308-4E71-A778-18A04461DC45}"/>
-              </a:ext>
-            </a:extLst>
-          </p:cNvPr>
-          <p:cNvSpPr/>
-          <p:nvPr/>
-        </p:nvSpPr>
-        <p:spPr>
-          <a:xfrm>
-            <a:off x="6828518" y="5192529"/>
-            <a:ext cx="325994" cy="211342"/>
-          </a:xfrm>
-          <a:prstGeom prst="triangle">
-            <a:avLst/>
-          </a:prstGeom>
-          <a:noFill/>
-          <a:ln w="19050" cap="flat" cmpd="sng" algn="ctr">
-            <a:solidFill>
-              <a:schemeClr val="dk1"/>
-            </a:solidFill>
-            <a:prstDash val="solid"/>
-            <a:round/>
-            <a:headEnd type="none" w="med" len="med"/>
-            <a:tailEnd type="none" w="med" len="med"/>
-          </a:ln>
-        </p:spPr>
-        <p:style>
-          <a:lnRef idx="0">
-            <a:scrgbClr r="0" g="0" b="0"/>
-          </a:lnRef>
-          <a:fillRef idx="0">
-            <a:scrgbClr r="0" g="0" b="0"/>
-          </a:fillRef>
-          <a:effectRef idx="0">
-            <a:scrgbClr r="0" g="0" b="0"/>
-          </a:effectRef>
-          <a:fontRef idx="minor">
-            <a:schemeClr val="dk1"/>
-          </a:fontRef>
-        </p:style>
-        <p:txBody>
-          <a:bodyPr rtlCol="0" anchor="ctr"/>
-          <a:lstStyle/>
-          <a:p>
-            <a:pPr algn="ctr"/>
-            <a:endParaRPr lang="en-US"/>
-          </a:p>
-        </p:txBody>
-      </p:sp>
-      <p:cxnSp>
-        <p:nvCxnSpPr>
-          <p:cNvPr id="21" name="Straight Connector 20">
-            <a:extLst>
-              <a:ext uri="{FF2B5EF4-FFF2-40B4-BE49-F238E27FC236}">
-                <a16:creationId xmlns:a16="http://schemas.microsoft.com/office/drawing/2014/main" id="{8B81F4B8-E9DD-435C-BBFC-89C972CD8FE3}"/>
-              </a:ext>
-            </a:extLst>
-          </p:cNvPr>
-          <p:cNvCxnSpPr>
-            <a:cxnSpLocks/>
-          </p:cNvCxnSpPr>
-          <p:nvPr/>
-        </p:nvCxnSpPr>
-        <p:spPr>
-          <a:xfrm flipV="1">
-            <a:off x="9094131" y="2463999"/>
-            <a:ext cx="0" cy="1337631"/>
-          </a:xfrm>
-          <a:prstGeom prst="line">
-            <a:avLst/>
-          </a:prstGeom>
-          <a:ln w="19050"/>
-        </p:spPr>
-        <p:style>
-          <a:lnRef idx="3">
-            <a:schemeClr val="dk1"/>
-          </a:lnRef>
-          <a:fillRef idx="0">
-            <a:schemeClr val="dk1"/>
-          </a:fillRef>
-          <a:effectRef idx="2">
-            <a:schemeClr val="dk1"/>
-          </a:effectRef>
-          <a:fontRef idx="minor">
-            <a:schemeClr val="tx1"/>
-          </a:fontRef>
-        </p:style>
-      </p:cxnSp>
-      <p:cxnSp>
-        <p:nvCxnSpPr>
-          <p:cNvPr id="25" name="Straight Connector 24">
-            <a:extLst>
-              <a:ext uri="{FF2B5EF4-FFF2-40B4-BE49-F238E27FC236}">
-                <a16:creationId xmlns:a16="http://schemas.microsoft.com/office/drawing/2014/main" id="{80C3A65A-5098-4120-8CCA-969641FF4347}"/>
-              </a:ext>
-            </a:extLst>
-          </p:cNvPr>
-          <p:cNvCxnSpPr>
-            <a:cxnSpLocks/>
-          </p:cNvCxnSpPr>
-          <p:nvPr/>
-        </p:nvCxnSpPr>
-        <p:spPr>
-          <a:xfrm flipV="1">
-            <a:off x="7352494" y="2454969"/>
-            <a:ext cx="0" cy="817463"/>
-          </a:xfrm>
-          <a:prstGeom prst="line">
-            <a:avLst/>
-          </a:prstGeom>
-          <a:ln w="19050"/>
-        </p:spPr>
-        <p:style>
-          <a:lnRef idx="3">
-            <a:schemeClr val="dk1"/>
-          </a:lnRef>
-          <a:fillRef idx="0">
-            <a:schemeClr val="dk1"/>
-          </a:fillRef>
-          <a:effectRef idx="2">
-            <a:schemeClr val="dk1"/>
-          </a:effectRef>
-          <a:fontRef idx="minor">
-            <a:schemeClr val="tx1"/>
-          </a:fontRef>
-        </p:style>
-      </p:cxnSp>
-      <p:cxnSp>
-        <p:nvCxnSpPr>
-          <p:cNvPr id="38" name="Straight Connector 37">
-            <a:extLst>
-              <a:ext uri="{FF2B5EF4-FFF2-40B4-BE49-F238E27FC236}">
-                <a16:creationId xmlns:a16="http://schemas.microsoft.com/office/drawing/2014/main" id="{0BE56339-EEDD-4AF9-A08B-CC731170335F}"/>
-              </a:ext>
-            </a:extLst>
-          </p:cNvPr>
-          <p:cNvCxnSpPr>
-            <a:cxnSpLocks/>
-          </p:cNvCxnSpPr>
-          <p:nvPr/>
-        </p:nvCxnSpPr>
-        <p:spPr>
-          <a:xfrm flipH="1">
-            <a:off x="7606148" y="739740"/>
-            <a:ext cx="580413" cy="0"/>
-          </a:xfrm>
-          <a:prstGeom prst="line">
-            <a:avLst/>
-          </a:prstGeom>
-          <a:ln w="19050"/>
-        </p:spPr>
-        <p:style>
-          <a:lnRef idx="3">
-            <a:schemeClr val="dk1"/>
-          </a:lnRef>
-          <a:fillRef idx="0">
-            <a:schemeClr val="dk1"/>
-          </a:fillRef>
-          <a:effectRef idx="2">
-            <a:schemeClr val="dk1"/>
-          </a:effectRef>
-          <a:fontRef idx="minor">
-            <a:schemeClr val="tx1"/>
-          </a:fontRef>
-        </p:style>
-      </p:cxnSp>
-      <p:cxnSp>
-        <p:nvCxnSpPr>
-          <p:cNvPr id="52" name="Straight Connector 51">
-            <a:extLst>
-              <a:ext uri="{FF2B5EF4-FFF2-40B4-BE49-F238E27FC236}">
-                <a16:creationId xmlns:a16="http://schemas.microsoft.com/office/drawing/2014/main" id="{8D5436F5-60AA-47A2-8FA9-7891EA494C2C}"/>
-              </a:ext>
-            </a:extLst>
-          </p:cNvPr>
-          <p:cNvCxnSpPr>
-            <a:cxnSpLocks/>
-            <a:stCxn id="12" idx="0"/>
-          </p:cNvCxnSpPr>
-          <p:nvPr/>
-        </p:nvCxnSpPr>
-        <p:spPr>
-          <a:xfrm flipV="1">
-            <a:off x="8186562" y="734289"/>
-            <a:ext cx="0" cy="814206"/>
-          </a:xfrm>
-          <a:prstGeom prst="line">
-            <a:avLst/>
-          </a:prstGeom>
-          <a:ln w="19050"/>
-        </p:spPr>
-        <p:style>
-          <a:lnRef idx="3">
-            <a:schemeClr val="dk1"/>
-          </a:lnRef>
-          <a:fillRef idx="0">
-            <a:schemeClr val="dk1"/>
-          </a:fillRef>
-          <a:effectRef idx="2">
-            <a:schemeClr val="dk1"/>
-          </a:effectRef>
-          <a:fontRef idx="minor">
-            <a:schemeClr val="tx1"/>
-          </a:fontRef>
-        </p:style>
-      </p:cxnSp>
-      <p:grpSp>
-        <p:nvGrpSpPr>
-          <p:cNvPr id="57" name="Group 56">
-            <a:extLst>
-              <a:ext uri="{FF2B5EF4-FFF2-40B4-BE49-F238E27FC236}">
-                <a16:creationId xmlns:a16="http://schemas.microsoft.com/office/drawing/2014/main" id="{B3D623AD-EE19-4387-8E74-65EB264F6DEB}"/>
-              </a:ext>
-            </a:extLst>
-          </p:cNvPr>
-          <p:cNvGrpSpPr/>
-          <p:nvPr/>
-        </p:nvGrpSpPr>
-        <p:grpSpPr>
-          <a:xfrm rot="10800000">
-            <a:off x="3354504" y="2532315"/>
-            <a:ext cx="2706856" cy="321792"/>
-            <a:chOff x="2614520" y="1428895"/>
-            <a:chExt cx="2995210" cy="445634"/>
-          </a:xfrm>
-        </p:grpSpPr>
-        <p:cxnSp>
-          <p:nvCxnSpPr>
-            <p:cNvPr id="58" name="Straight Connector 57">
-              <a:extLst>
-                <a:ext uri="{FF2B5EF4-FFF2-40B4-BE49-F238E27FC236}">
-                  <a16:creationId xmlns:a16="http://schemas.microsoft.com/office/drawing/2014/main" id="{054ECDE7-1C34-494D-8A6C-B025B2F82183}"/>
-                </a:ext>
-              </a:extLst>
-            </p:cNvPr>
-            <p:cNvCxnSpPr>
-              <a:cxnSpLocks/>
-            </p:cNvCxnSpPr>
-            <p:nvPr/>
-          </p:nvCxnSpPr>
-          <p:spPr>
-            <a:xfrm rot="10800000" flipH="1">
-              <a:off x="2614520" y="1651712"/>
-              <a:ext cx="2524154" cy="0"/>
-            </a:xfrm>
-            <a:prstGeom prst="line">
-              <a:avLst/>
-            </a:prstGeom>
-            <a:ln w="19050"/>
-          </p:spPr>
-          <p:style>
-            <a:lnRef idx="3">
-              <a:schemeClr val="dk1"/>
-            </a:lnRef>
-            <a:fillRef idx="0">
-              <a:schemeClr val="dk1"/>
-            </a:fillRef>
-            <a:effectRef idx="2">
-              <a:schemeClr val="dk1"/>
-            </a:effectRef>
-            <a:fontRef idx="minor">
-              <a:schemeClr val="tx1"/>
-            </a:fontRef>
-          </p:style>
-        </p:cxnSp>
-        <p:sp>
-          <p:nvSpPr>
-            <p:cNvPr id="59" name="Diamond 58">
-              <a:extLst>
-                <a:ext uri="{FF2B5EF4-FFF2-40B4-BE49-F238E27FC236}">
-                  <a16:creationId xmlns:a16="http://schemas.microsoft.com/office/drawing/2014/main" id="{F526E052-55DF-4FC5-9951-5B29495DDEDD}"/>
-                </a:ext>
-              </a:extLst>
-            </p:cNvPr>
-            <p:cNvSpPr/>
-            <p:nvPr/>
-          </p:nvSpPr>
-          <p:spPr>
-            <a:xfrm>
-              <a:off x="5138675" y="1428895"/>
-              <a:ext cx="471055" cy="445634"/>
-            </a:xfrm>
-            <a:prstGeom prst="diamond">
-              <a:avLst/>
-            </a:prstGeom>
-          </p:spPr>
-          <p:style>
-            <a:lnRef idx="2">
-              <a:schemeClr val="dk1">
-                <a:shade val="50000"/>
-              </a:schemeClr>
-            </a:lnRef>
-            <a:fillRef idx="1">
-              <a:schemeClr val="dk1"/>
-            </a:fillRef>
-            <a:effectRef idx="0">
-              <a:schemeClr val="dk1"/>
-            </a:effectRef>
-            <a:fontRef idx="minor">
-              <a:schemeClr val="lt1"/>
-            </a:fontRef>
-          </p:style>
-          <p:txBody>
-            <a:bodyPr rtlCol="0" anchor="ctr"/>
-            <a:lstStyle/>
-            <a:p>
-              <a:pPr algn="ctr"/>
-              <a:endParaRPr lang="en-US"/>
-            </a:p>
-          </p:txBody>
-        </p:sp>
-      </p:grpSp>
-      <p:cxnSp>
-        <p:nvCxnSpPr>
-          <p:cNvPr id="60" name="Straight Connector 59">
-            <a:extLst>
-              <a:ext uri="{FF2B5EF4-FFF2-40B4-BE49-F238E27FC236}">
-                <a16:creationId xmlns:a16="http://schemas.microsoft.com/office/drawing/2014/main" id="{60207306-4F31-446F-8039-3F7C34A72300}"/>
-              </a:ext>
-            </a:extLst>
-          </p:cNvPr>
-          <p:cNvCxnSpPr>
-            <a:cxnSpLocks/>
-          </p:cNvCxnSpPr>
-          <p:nvPr/>
-        </p:nvCxnSpPr>
-        <p:spPr>
-          <a:xfrm flipH="1">
-            <a:off x="6056743" y="1820968"/>
-            <a:ext cx="771775" cy="0"/>
-          </a:xfrm>
-          <a:prstGeom prst="line">
-            <a:avLst/>
-          </a:prstGeom>
-          <a:ln w="19050"/>
-        </p:spPr>
-        <p:style>
-          <a:lnRef idx="3">
-            <a:schemeClr val="dk1"/>
-          </a:lnRef>
-          <a:fillRef idx="0">
-            <a:schemeClr val="dk1"/>
-          </a:fillRef>
-          <a:effectRef idx="2">
-            <a:schemeClr val="dk1"/>
-          </a:effectRef>
-          <a:fontRef idx="minor">
-            <a:schemeClr val="tx1"/>
-          </a:fontRef>
-        </p:style>
-      </p:cxnSp>
-      <p:cxnSp>
-        <p:nvCxnSpPr>
-          <p:cNvPr id="63" name="Straight Connector 62">
-            <a:extLst>
-              <a:ext uri="{FF2B5EF4-FFF2-40B4-BE49-F238E27FC236}">
-                <a16:creationId xmlns:a16="http://schemas.microsoft.com/office/drawing/2014/main" id="{BAFB2312-ED12-4763-A78F-E236E3AD0702}"/>
-              </a:ext>
-            </a:extLst>
-          </p:cNvPr>
-          <p:cNvCxnSpPr>
-            <a:cxnSpLocks/>
-          </p:cNvCxnSpPr>
-          <p:nvPr/>
-        </p:nvCxnSpPr>
-        <p:spPr>
-          <a:xfrm flipV="1">
-            <a:off x="6056743" y="1820968"/>
-            <a:ext cx="4617" cy="872244"/>
-          </a:xfrm>
-          <a:prstGeom prst="line">
-            <a:avLst/>
-          </a:prstGeom>
-          <a:ln w="19050"/>
-        </p:spPr>
-        <p:style>
-          <a:lnRef idx="3">
-            <a:schemeClr val="dk1"/>
-          </a:lnRef>
-          <a:fillRef idx="0">
-            <a:schemeClr val="dk1"/>
-          </a:fillRef>
-          <a:effectRef idx="2">
-            <a:schemeClr val="dk1"/>
-          </a:effectRef>
-          <a:fontRef idx="minor">
-            <a:schemeClr val="tx1"/>
-          </a:fontRef>
-        </p:style>
-      </p:cxnSp>
-      <p:grpSp>
-        <p:nvGrpSpPr>
-          <p:cNvPr id="71" name="Group 70">
-            <a:extLst>
-              <a:ext uri="{FF2B5EF4-FFF2-40B4-BE49-F238E27FC236}">
-                <a16:creationId xmlns:a16="http://schemas.microsoft.com/office/drawing/2014/main" id="{48B54C74-2861-48B4-9682-A7F7C499907C}"/>
-              </a:ext>
-            </a:extLst>
-          </p:cNvPr>
-          <p:cNvGrpSpPr/>
-          <p:nvPr/>
-        </p:nvGrpSpPr>
-        <p:grpSpPr>
-          <a:xfrm rot="16200000">
-            <a:off x="2700080" y="3087244"/>
-            <a:ext cx="612716" cy="321792"/>
-            <a:chOff x="4931743" y="1428895"/>
-            <a:chExt cx="677987" cy="445634"/>
-          </a:xfrm>
-        </p:grpSpPr>
-        <p:cxnSp>
-          <p:nvCxnSpPr>
-            <p:cNvPr id="72" name="Straight Connector 71">
-              <a:extLst>
-                <a:ext uri="{FF2B5EF4-FFF2-40B4-BE49-F238E27FC236}">
-                  <a16:creationId xmlns:a16="http://schemas.microsoft.com/office/drawing/2014/main" id="{C41A7802-ACE3-4082-81CB-9B2A820B9523}"/>
-                </a:ext>
-              </a:extLst>
-            </p:cNvPr>
-            <p:cNvCxnSpPr>
-              <a:cxnSpLocks/>
-            </p:cNvCxnSpPr>
-            <p:nvPr/>
-          </p:nvCxnSpPr>
-          <p:spPr>
-            <a:xfrm rot="5400000" flipV="1">
-              <a:off x="5035207" y="1548249"/>
-              <a:ext cx="0" cy="206927"/>
-            </a:xfrm>
-            <a:prstGeom prst="line">
-              <a:avLst/>
-            </a:prstGeom>
-            <a:ln w="19050"/>
-          </p:spPr>
-          <p:style>
-            <a:lnRef idx="3">
-              <a:schemeClr val="dk1"/>
-            </a:lnRef>
-            <a:fillRef idx="0">
-              <a:schemeClr val="dk1"/>
-            </a:fillRef>
-            <a:effectRef idx="2">
-              <a:schemeClr val="dk1"/>
-            </a:effectRef>
-            <a:fontRef idx="minor">
-              <a:schemeClr val="tx1"/>
-            </a:fontRef>
-          </p:style>
-        </p:cxnSp>
-        <p:sp>
-          <p:nvSpPr>
-            <p:cNvPr id="73" name="Diamond 72">
-              <a:extLst>
-                <a:ext uri="{FF2B5EF4-FFF2-40B4-BE49-F238E27FC236}">
-                  <a16:creationId xmlns:a16="http://schemas.microsoft.com/office/drawing/2014/main" id="{E1E4FF43-884A-4DB8-836F-AC2152A9233A}"/>
-                </a:ext>
-              </a:extLst>
-            </p:cNvPr>
-            <p:cNvSpPr/>
-            <p:nvPr/>
-          </p:nvSpPr>
-          <p:spPr>
-            <a:xfrm>
-              <a:off x="5138675" y="1428895"/>
-              <a:ext cx="471055" cy="445634"/>
-            </a:xfrm>
-            <a:prstGeom prst="diamond">
-              <a:avLst/>
-            </a:prstGeom>
-          </p:spPr>
-          <p:style>
-            <a:lnRef idx="2">
-              <a:schemeClr val="dk1">
-                <a:shade val="50000"/>
-              </a:schemeClr>
-            </a:lnRef>
-            <a:fillRef idx="1">
-              <a:schemeClr val="dk1"/>
-            </a:fillRef>
-            <a:effectRef idx="0">
-              <a:schemeClr val="dk1"/>
-            </a:effectRef>
-            <a:fontRef idx="minor">
-              <a:schemeClr val="lt1"/>
-            </a:fontRef>
-          </p:style>
-          <p:txBody>
-            <a:bodyPr rtlCol="0" anchor="ctr"/>
-            <a:lstStyle/>
-            <a:p>
-              <a:pPr algn="ctr"/>
-              <a:endParaRPr lang="en-US"/>
-            </a:p>
-          </p:txBody>
-        </p:sp>
-      </p:grpSp>
-      <p:grpSp>
-        <p:nvGrpSpPr>
-          <p:cNvPr id="74" name="Group 73">
-            <a:extLst>
-              <a:ext uri="{FF2B5EF4-FFF2-40B4-BE49-F238E27FC236}">
-                <a16:creationId xmlns:a16="http://schemas.microsoft.com/office/drawing/2014/main" id="{F480E860-D90D-48FF-9C0A-A4D63ADCB2DF}"/>
-              </a:ext>
-            </a:extLst>
-          </p:cNvPr>
-          <p:cNvGrpSpPr/>
-          <p:nvPr/>
-        </p:nvGrpSpPr>
-        <p:grpSpPr>
-          <a:xfrm rot="16200000">
-            <a:off x="1822515" y="3364737"/>
-            <a:ext cx="1119909" cy="321792"/>
-            <a:chOff x="4370521" y="1428895"/>
-            <a:chExt cx="1239209" cy="445634"/>
-          </a:xfrm>
-        </p:grpSpPr>
-        <p:cxnSp>
-          <p:nvCxnSpPr>
-            <p:cNvPr id="75" name="Straight Connector 74">
-              <a:extLst>
-                <a:ext uri="{FF2B5EF4-FFF2-40B4-BE49-F238E27FC236}">
-                  <a16:creationId xmlns:a16="http://schemas.microsoft.com/office/drawing/2014/main" id="{BBFB3958-CF0C-400E-8738-B380524B3872}"/>
-                </a:ext>
-              </a:extLst>
-            </p:cNvPr>
-            <p:cNvCxnSpPr>
-              <a:cxnSpLocks/>
-            </p:cNvCxnSpPr>
-            <p:nvPr/>
-          </p:nvCxnSpPr>
-          <p:spPr>
-            <a:xfrm rot="5400000" flipV="1">
-              <a:off x="4754597" y="1267636"/>
-              <a:ext cx="0" cy="768151"/>
-            </a:xfrm>
-            <a:prstGeom prst="line">
-              <a:avLst/>
-            </a:prstGeom>
-            <a:ln w="19050"/>
-          </p:spPr>
-          <p:style>
-            <a:lnRef idx="3">
-              <a:schemeClr val="dk1"/>
-            </a:lnRef>
-            <a:fillRef idx="0">
-              <a:schemeClr val="dk1"/>
-            </a:fillRef>
-            <a:effectRef idx="2">
-              <a:schemeClr val="dk1"/>
-            </a:effectRef>
-            <a:fontRef idx="minor">
-              <a:schemeClr val="tx1"/>
-            </a:fontRef>
-          </p:style>
-        </p:cxnSp>
-        <p:sp>
-          <p:nvSpPr>
-            <p:cNvPr id="76" name="Diamond 75">
-              <a:extLst>
-                <a:ext uri="{FF2B5EF4-FFF2-40B4-BE49-F238E27FC236}">
-                  <a16:creationId xmlns:a16="http://schemas.microsoft.com/office/drawing/2014/main" id="{748FBC05-6EDA-4EAC-89C7-F09A3C503761}"/>
-                </a:ext>
-              </a:extLst>
-            </p:cNvPr>
-            <p:cNvSpPr/>
-            <p:nvPr/>
-          </p:nvSpPr>
-          <p:spPr>
-            <a:xfrm>
-              <a:off x="5138675" y="1428895"/>
-              <a:ext cx="471055" cy="445634"/>
-            </a:xfrm>
-            <a:prstGeom prst="diamond">
-              <a:avLst/>
-            </a:prstGeom>
-          </p:spPr>
-          <p:style>
-            <a:lnRef idx="2">
-              <a:schemeClr val="dk1">
-                <a:shade val="50000"/>
-              </a:schemeClr>
-            </a:lnRef>
-            <a:fillRef idx="1">
-              <a:schemeClr val="dk1"/>
-            </a:fillRef>
-            <a:effectRef idx="0">
-              <a:schemeClr val="dk1"/>
-            </a:effectRef>
-            <a:fontRef idx="minor">
-              <a:schemeClr val="lt1"/>
-            </a:fontRef>
-          </p:style>
-          <p:txBody>
-            <a:bodyPr rtlCol="0" anchor="ctr"/>
-            <a:lstStyle/>
-            <a:p>
-              <a:pPr algn="ctr"/>
-              <a:endParaRPr lang="en-US"/>
-            </a:p>
-          </p:txBody>
-        </p:sp>
-      </p:grpSp>
-      <p:cxnSp>
-        <p:nvCxnSpPr>
-          <p:cNvPr id="78" name="Straight Connector 77">
-            <a:extLst>
-              <a:ext uri="{FF2B5EF4-FFF2-40B4-BE49-F238E27FC236}">
-                <a16:creationId xmlns:a16="http://schemas.microsoft.com/office/drawing/2014/main" id="{3F29787E-AFD2-4834-BFD6-6C7F7268D7EA}"/>
-              </a:ext>
-            </a:extLst>
-          </p:cNvPr>
-          <p:cNvCxnSpPr>
-            <a:cxnSpLocks/>
-          </p:cNvCxnSpPr>
-          <p:nvPr/>
-        </p:nvCxnSpPr>
-        <p:spPr>
-          <a:xfrm flipH="1">
-            <a:off x="3006438" y="3554498"/>
-            <a:ext cx="2867889" cy="0"/>
-          </a:xfrm>
-          <a:prstGeom prst="line">
-            <a:avLst/>
-          </a:prstGeom>
-          <a:ln w="19050"/>
-        </p:spPr>
-        <p:style>
-          <a:lnRef idx="3">
-            <a:schemeClr val="dk1"/>
-          </a:lnRef>
-          <a:fillRef idx="0">
-            <a:schemeClr val="dk1"/>
-          </a:fillRef>
-          <a:effectRef idx="2">
-            <a:schemeClr val="dk1"/>
-          </a:effectRef>
-          <a:fontRef idx="minor">
-            <a:schemeClr val="tx1"/>
-          </a:fontRef>
-        </p:style>
-      </p:cxnSp>
-      <p:cxnSp>
-        <p:nvCxnSpPr>
-          <p:cNvPr id="82" name="Straight Connector 81">
-            <a:extLst>
-              <a:ext uri="{FF2B5EF4-FFF2-40B4-BE49-F238E27FC236}">
-                <a16:creationId xmlns:a16="http://schemas.microsoft.com/office/drawing/2014/main" id="{FD51C66C-1F82-4EB4-805A-405C255D11C5}"/>
-              </a:ext>
-            </a:extLst>
-          </p:cNvPr>
-          <p:cNvCxnSpPr>
-            <a:cxnSpLocks/>
-            <a:stCxn id="6" idx="1"/>
-          </p:cNvCxnSpPr>
-          <p:nvPr/>
-        </p:nvCxnSpPr>
-        <p:spPr>
-          <a:xfrm flipH="1" flipV="1">
-            <a:off x="2375554" y="4085588"/>
-            <a:ext cx="5983168" cy="4264"/>
-          </a:xfrm>
-          <a:prstGeom prst="line">
-            <a:avLst/>
-          </a:prstGeom>
-          <a:ln w="19050"/>
-        </p:spPr>
-        <p:style>
-          <a:lnRef idx="3">
-            <a:schemeClr val="dk1"/>
-          </a:lnRef>
-          <a:fillRef idx="0">
-            <a:schemeClr val="dk1"/>
-          </a:fillRef>
-          <a:effectRef idx="2">
-            <a:schemeClr val="dk1"/>
-          </a:effectRef>
-          <a:fontRef idx="minor">
-            <a:schemeClr val="tx1"/>
-          </a:fontRef>
-        </p:style>
-      </p:cxnSp>
-      <p:grpSp>
-        <p:nvGrpSpPr>
-          <p:cNvPr id="91" name="Group 90">
-            <a:extLst>
-              <a:ext uri="{FF2B5EF4-FFF2-40B4-BE49-F238E27FC236}">
-                <a16:creationId xmlns:a16="http://schemas.microsoft.com/office/drawing/2014/main" id="{7E4917D3-7F80-4A25-87AF-F8AC99C7AEEE}"/>
-              </a:ext>
-            </a:extLst>
-          </p:cNvPr>
-          <p:cNvGrpSpPr/>
-          <p:nvPr/>
-        </p:nvGrpSpPr>
-        <p:grpSpPr>
-          <a:xfrm rot="10800000">
-            <a:off x="2764815" y="4763065"/>
-            <a:ext cx="2335963" cy="321792"/>
-            <a:chOff x="3024924" y="1428895"/>
-            <a:chExt cx="2584806" cy="445634"/>
-          </a:xfrm>
-        </p:grpSpPr>
-        <p:cxnSp>
-          <p:nvCxnSpPr>
-            <p:cNvPr id="92" name="Straight Connector 91">
-              <a:extLst>
-                <a:ext uri="{FF2B5EF4-FFF2-40B4-BE49-F238E27FC236}">
-                  <a16:creationId xmlns:a16="http://schemas.microsoft.com/office/drawing/2014/main" id="{6787D25A-D09E-4944-8B6E-1158BA368235}"/>
-                </a:ext>
-              </a:extLst>
-            </p:cNvPr>
-            <p:cNvCxnSpPr>
-              <a:cxnSpLocks/>
-              <a:stCxn id="10" idx="1"/>
-            </p:cNvCxnSpPr>
-            <p:nvPr/>
-          </p:nvCxnSpPr>
-          <p:spPr>
-            <a:xfrm rot="10800000" flipH="1">
-              <a:off x="3024924" y="1651712"/>
-              <a:ext cx="2113751" cy="5408"/>
-            </a:xfrm>
-            <a:prstGeom prst="line">
-              <a:avLst/>
-            </a:prstGeom>
-            <a:ln w="19050"/>
-          </p:spPr>
-          <p:style>
-            <a:lnRef idx="3">
-              <a:schemeClr val="dk1"/>
-            </a:lnRef>
-            <a:fillRef idx="0">
-              <a:schemeClr val="dk1"/>
-            </a:fillRef>
-            <a:effectRef idx="2">
-              <a:schemeClr val="dk1"/>
-            </a:effectRef>
-            <a:fontRef idx="minor">
-              <a:schemeClr val="tx1"/>
-            </a:fontRef>
-          </p:style>
-        </p:cxnSp>
-        <p:sp>
-          <p:nvSpPr>
-            <p:cNvPr id="93" name="Diamond 92">
-              <a:extLst>
-                <a:ext uri="{FF2B5EF4-FFF2-40B4-BE49-F238E27FC236}">
-                  <a16:creationId xmlns:a16="http://schemas.microsoft.com/office/drawing/2014/main" id="{8E0B7D3F-1B93-4BB9-82F8-B4D0ACD92BBE}"/>
-                </a:ext>
-              </a:extLst>
-            </p:cNvPr>
-            <p:cNvSpPr/>
-            <p:nvPr/>
-          </p:nvSpPr>
-          <p:spPr>
-            <a:xfrm>
-              <a:off x="5138675" y="1428895"/>
-              <a:ext cx="471055" cy="445634"/>
-            </a:xfrm>
-            <a:prstGeom prst="diamond">
-              <a:avLst/>
-            </a:prstGeom>
-          </p:spPr>
-          <p:style>
-            <a:lnRef idx="2">
-              <a:schemeClr val="dk1">
-                <a:shade val="50000"/>
-              </a:schemeClr>
-            </a:lnRef>
-            <a:fillRef idx="1">
-              <a:schemeClr val="dk1"/>
-            </a:fillRef>
-            <a:effectRef idx="0">
-              <a:schemeClr val="dk1"/>
-            </a:effectRef>
-            <a:fontRef idx="minor">
-              <a:schemeClr val="lt1"/>
-            </a:fontRef>
-          </p:style>
-          <p:txBody>
-            <a:bodyPr rtlCol="0" anchor="ctr"/>
-            <a:lstStyle/>
-            <a:p>
-              <a:pPr algn="ctr"/>
-              <a:endParaRPr lang="en-US"/>
-            </a:p>
-          </p:txBody>
-        </p:sp>
-      </p:grpSp>
-      <p:grpSp>
-        <p:nvGrpSpPr>
-          <p:cNvPr id="96" name="Group 95">
-            <a:extLst>
-              <a:ext uri="{FF2B5EF4-FFF2-40B4-BE49-F238E27FC236}">
-                <a16:creationId xmlns:a16="http://schemas.microsoft.com/office/drawing/2014/main" id="{EA78AD4D-50CC-428A-A88C-581E47E5D62F}"/>
-              </a:ext>
-            </a:extLst>
-          </p:cNvPr>
-          <p:cNvGrpSpPr/>
-          <p:nvPr/>
-        </p:nvGrpSpPr>
-        <p:grpSpPr>
-          <a:xfrm rot="16200000">
-            <a:off x="950103" y="5645490"/>
-            <a:ext cx="1222316" cy="321792"/>
-            <a:chOff x="4257204" y="1428895"/>
-            <a:chExt cx="1352526" cy="445634"/>
-          </a:xfrm>
-        </p:grpSpPr>
-        <p:cxnSp>
-          <p:nvCxnSpPr>
-            <p:cNvPr id="97" name="Straight Connector 96">
-              <a:extLst>
-                <a:ext uri="{FF2B5EF4-FFF2-40B4-BE49-F238E27FC236}">
-                  <a16:creationId xmlns:a16="http://schemas.microsoft.com/office/drawing/2014/main" id="{B5B241E9-5A9D-4CF2-8F9C-EBF929A89592}"/>
-                </a:ext>
-              </a:extLst>
-            </p:cNvPr>
-            <p:cNvCxnSpPr>
-              <a:cxnSpLocks/>
-            </p:cNvCxnSpPr>
-            <p:nvPr/>
-          </p:nvCxnSpPr>
-          <p:spPr>
-            <a:xfrm rot="5400000" flipV="1">
-              <a:off x="4697937" y="1210979"/>
-              <a:ext cx="0" cy="881466"/>
-            </a:xfrm>
-            <a:prstGeom prst="line">
-              <a:avLst/>
-            </a:prstGeom>
-            <a:ln w="19050"/>
-          </p:spPr>
-          <p:style>
-            <a:lnRef idx="3">
-              <a:schemeClr val="dk1"/>
-            </a:lnRef>
-            <a:fillRef idx="0">
-              <a:schemeClr val="dk1"/>
-            </a:fillRef>
-            <a:effectRef idx="2">
-              <a:schemeClr val="dk1"/>
-            </a:effectRef>
-            <a:fontRef idx="minor">
-              <a:schemeClr val="tx1"/>
-            </a:fontRef>
-          </p:style>
-        </p:cxnSp>
-        <p:sp>
-          <p:nvSpPr>
-            <p:cNvPr id="98" name="Diamond 97">
-              <a:extLst>
-                <a:ext uri="{FF2B5EF4-FFF2-40B4-BE49-F238E27FC236}">
-                  <a16:creationId xmlns:a16="http://schemas.microsoft.com/office/drawing/2014/main" id="{96D8F7BF-E4E1-443A-9086-EF7179C9F921}"/>
-                </a:ext>
-              </a:extLst>
-            </p:cNvPr>
-            <p:cNvSpPr/>
-            <p:nvPr/>
-          </p:nvSpPr>
-          <p:spPr>
-            <a:xfrm>
-              <a:off x="5138675" y="1428895"/>
-              <a:ext cx="471055" cy="445634"/>
-            </a:xfrm>
-            <a:prstGeom prst="diamond">
-              <a:avLst/>
-            </a:prstGeom>
-          </p:spPr>
-          <p:style>
-            <a:lnRef idx="2">
-              <a:schemeClr val="dk1">
-                <a:shade val="50000"/>
-              </a:schemeClr>
-            </a:lnRef>
-            <a:fillRef idx="1">
-              <a:schemeClr val="dk1"/>
-            </a:fillRef>
-            <a:effectRef idx="0">
-              <a:schemeClr val="dk1"/>
-            </a:effectRef>
-            <a:fontRef idx="minor">
-              <a:schemeClr val="lt1"/>
-            </a:fontRef>
-          </p:style>
-          <p:txBody>
-            <a:bodyPr rtlCol="0" anchor="ctr"/>
-            <a:lstStyle/>
-            <a:p>
-              <a:pPr algn="ctr"/>
-              <a:endParaRPr lang="en-US"/>
-            </a:p>
-          </p:txBody>
-        </p:sp>
-      </p:grpSp>
-      <p:cxnSp>
-        <p:nvCxnSpPr>
-          <p:cNvPr id="99" name="Straight Connector 98">
-            <a:extLst>
-              <a:ext uri="{FF2B5EF4-FFF2-40B4-BE49-F238E27FC236}">
-                <a16:creationId xmlns:a16="http://schemas.microsoft.com/office/drawing/2014/main" id="{6BBD5523-241D-414A-A8FC-F292B27C09DE}"/>
-              </a:ext>
-            </a:extLst>
-          </p:cNvPr>
-          <p:cNvCxnSpPr>
-            <a:cxnSpLocks/>
-          </p:cNvCxnSpPr>
-          <p:nvPr/>
-        </p:nvCxnSpPr>
-        <p:spPr>
-          <a:xfrm flipH="1">
-            <a:off x="1561261" y="6417544"/>
-            <a:ext cx="2144211" cy="0"/>
-          </a:xfrm>
-          <a:prstGeom prst="line">
-            <a:avLst/>
-          </a:prstGeom>
-          <a:ln w="19050"/>
-        </p:spPr>
-        <p:style>
-          <a:lnRef idx="3">
-            <a:schemeClr val="dk1"/>
-          </a:lnRef>
-          <a:fillRef idx="0">
-            <a:schemeClr val="dk1"/>
-          </a:fillRef>
-          <a:effectRef idx="2">
-            <a:schemeClr val="dk1"/>
-          </a:effectRef>
-          <a:fontRef idx="minor">
-            <a:schemeClr val="tx1"/>
-          </a:fontRef>
-        </p:style>
-      </p:cxnSp>
-      <p:grpSp>
-        <p:nvGrpSpPr>
-          <p:cNvPr id="103" name="Group 102">
-            <a:extLst>
-              <a:ext uri="{FF2B5EF4-FFF2-40B4-BE49-F238E27FC236}">
-                <a16:creationId xmlns:a16="http://schemas.microsoft.com/office/drawing/2014/main" id="{160038A7-5ED9-4D17-A54C-4F1D79E174B6}"/>
-              </a:ext>
-            </a:extLst>
-          </p:cNvPr>
-          <p:cNvGrpSpPr/>
-          <p:nvPr/>
-        </p:nvGrpSpPr>
-        <p:grpSpPr>
-          <a:xfrm rot="10800000">
-            <a:off x="7297538" y="4939524"/>
-            <a:ext cx="781960" cy="294134"/>
-            <a:chOff x="4447689" y="5731164"/>
-            <a:chExt cx="992529" cy="341746"/>
-          </a:xfrm>
-        </p:grpSpPr>
-        <p:cxnSp>
-          <p:nvCxnSpPr>
-            <p:cNvPr id="104" name="Straight Connector 103">
-              <a:extLst>
-                <a:ext uri="{FF2B5EF4-FFF2-40B4-BE49-F238E27FC236}">
-                  <a16:creationId xmlns:a16="http://schemas.microsoft.com/office/drawing/2014/main" id="{52AC6C74-033D-477E-B56B-52CADA9B4328}"/>
-                </a:ext>
-              </a:extLst>
-            </p:cNvPr>
-            <p:cNvCxnSpPr>
-              <a:cxnSpLocks/>
-            </p:cNvCxnSpPr>
-            <p:nvPr/>
-          </p:nvCxnSpPr>
-          <p:spPr>
-            <a:xfrm rot="10800000" flipH="1">
-              <a:off x="4447689" y="5902037"/>
-              <a:ext cx="992527" cy="14423"/>
-            </a:xfrm>
-            <a:prstGeom prst="line">
-              <a:avLst/>
-            </a:prstGeom>
-            <a:ln w="19050"/>
-          </p:spPr>
-          <p:style>
-            <a:lnRef idx="3">
-              <a:schemeClr val="dk1"/>
-            </a:lnRef>
-            <a:fillRef idx="0">
-              <a:schemeClr val="dk1"/>
-            </a:fillRef>
-            <a:effectRef idx="2">
-              <a:schemeClr val="dk1"/>
-            </a:effectRef>
-            <a:fontRef idx="minor">
-              <a:schemeClr val="tx1"/>
-            </a:fontRef>
-          </p:style>
-        </p:cxnSp>
-        <p:cxnSp>
-          <p:nvCxnSpPr>
-            <p:cNvPr id="105" name="Straight Connector 104">
-              <a:extLst>
-                <a:ext uri="{FF2B5EF4-FFF2-40B4-BE49-F238E27FC236}">
-                  <a16:creationId xmlns:a16="http://schemas.microsoft.com/office/drawing/2014/main" id="{1B3E52B7-E95B-4BF6-A97E-6205591725A0}"/>
-                </a:ext>
-              </a:extLst>
-            </p:cNvPr>
-            <p:cNvCxnSpPr>
-              <a:cxnSpLocks/>
-            </p:cNvCxnSpPr>
-            <p:nvPr/>
-          </p:nvCxnSpPr>
-          <p:spPr>
-            <a:xfrm flipV="1">
-              <a:off x="5043054" y="5902037"/>
-              <a:ext cx="397164" cy="170873"/>
-            </a:xfrm>
-            <a:prstGeom prst="line">
-              <a:avLst/>
-            </a:prstGeom>
-            <a:ln w="19050"/>
-          </p:spPr>
-          <p:style>
-            <a:lnRef idx="3">
-              <a:schemeClr val="dk1"/>
-            </a:lnRef>
-            <a:fillRef idx="0">
-              <a:schemeClr val="dk1"/>
-            </a:fillRef>
-            <a:effectRef idx="2">
-              <a:schemeClr val="dk1"/>
-            </a:effectRef>
-            <a:fontRef idx="minor">
-              <a:schemeClr val="tx1"/>
-            </a:fontRef>
-          </p:style>
-        </p:cxnSp>
-        <p:cxnSp>
-          <p:nvCxnSpPr>
-            <p:cNvPr id="106" name="Straight Connector 105">
-              <a:extLst>
-                <a:ext uri="{FF2B5EF4-FFF2-40B4-BE49-F238E27FC236}">
-                  <a16:creationId xmlns:a16="http://schemas.microsoft.com/office/drawing/2014/main" id="{8D82475E-53B4-4AC8-A7DB-8C4E999B04E1}"/>
-                </a:ext>
-              </a:extLst>
-            </p:cNvPr>
-            <p:cNvCxnSpPr>
-              <a:cxnSpLocks/>
-            </p:cNvCxnSpPr>
-            <p:nvPr/>
-          </p:nvCxnSpPr>
-          <p:spPr>
-            <a:xfrm>
-              <a:off x="5043054" y="5731164"/>
-              <a:ext cx="397164" cy="170873"/>
-            </a:xfrm>
-            <a:prstGeom prst="line">
-              <a:avLst/>
-            </a:prstGeom>
-            <a:ln w="19050"/>
-          </p:spPr>
-          <p:style>
-            <a:lnRef idx="3">
-              <a:schemeClr val="dk1"/>
-            </a:lnRef>
-            <a:fillRef idx="0">
-              <a:schemeClr val="dk1"/>
-            </a:fillRef>
-            <a:effectRef idx="2">
-              <a:schemeClr val="dk1"/>
-            </a:effectRef>
-            <a:fontRef idx="minor">
-              <a:schemeClr val="tx1"/>
-            </a:fontRef>
-          </p:style>
-        </p:cxnSp>
-      </p:grpSp>
-      <p:cxnSp>
-        <p:nvCxnSpPr>
-          <p:cNvPr id="108" name="Straight Connector 107">
-            <a:extLst>
-              <a:ext uri="{FF2B5EF4-FFF2-40B4-BE49-F238E27FC236}">
-                <a16:creationId xmlns:a16="http://schemas.microsoft.com/office/drawing/2014/main" id="{8ACF8A07-9623-4D3B-9D53-B66AA2ACD1D4}"/>
-              </a:ext>
-            </a:extLst>
-          </p:cNvPr>
-          <p:cNvCxnSpPr>
-            <a:cxnSpLocks/>
-          </p:cNvCxnSpPr>
-          <p:nvPr/>
-        </p:nvCxnSpPr>
-        <p:spPr>
-          <a:xfrm flipV="1">
-            <a:off x="8072584" y="5074177"/>
-            <a:ext cx="0" cy="1073620"/>
-          </a:xfrm>
-          <a:prstGeom prst="line">
-            <a:avLst/>
-          </a:prstGeom>
-          <a:ln w="19050"/>
-        </p:spPr>
-        <p:style>
-          <a:lnRef idx="3">
-            <a:schemeClr val="dk1"/>
-          </a:lnRef>
-          <a:fillRef idx="0">
-            <a:schemeClr val="dk1"/>
-          </a:fillRef>
-          <a:effectRef idx="2">
-            <a:schemeClr val="dk1"/>
-          </a:effectRef>
-          <a:fontRef idx="minor">
-            <a:schemeClr val="tx1"/>
-          </a:fontRef>
-        </p:style>
-      </p:cxnSp>
-      <p:grpSp>
-        <p:nvGrpSpPr>
-          <p:cNvPr id="111" name="Group 110">
-            <a:extLst>
-              <a:ext uri="{FF2B5EF4-FFF2-40B4-BE49-F238E27FC236}">
-                <a16:creationId xmlns:a16="http://schemas.microsoft.com/office/drawing/2014/main" id="{B163A54C-1361-491A-8C27-3566A8DFEA79}"/>
-              </a:ext>
-            </a:extLst>
-          </p:cNvPr>
-          <p:cNvGrpSpPr/>
-          <p:nvPr/>
-        </p:nvGrpSpPr>
-        <p:grpSpPr>
-          <a:xfrm rot="16200000">
-            <a:off x="449647" y="3638349"/>
-            <a:ext cx="1691279" cy="321792"/>
-            <a:chOff x="3738285" y="1428895"/>
-            <a:chExt cx="1871445" cy="445634"/>
-          </a:xfrm>
-        </p:grpSpPr>
-        <p:cxnSp>
-          <p:nvCxnSpPr>
-            <p:cNvPr id="112" name="Straight Connector 111">
-              <a:extLst>
-                <a:ext uri="{FF2B5EF4-FFF2-40B4-BE49-F238E27FC236}">
-                  <a16:creationId xmlns:a16="http://schemas.microsoft.com/office/drawing/2014/main" id="{B2198E45-8D14-4088-9A4B-00978CAF690E}"/>
-                </a:ext>
-              </a:extLst>
-            </p:cNvPr>
-            <p:cNvCxnSpPr>
-              <a:cxnSpLocks/>
-            </p:cNvCxnSpPr>
-            <p:nvPr/>
-          </p:nvCxnSpPr>
-          <p:spPr>
-            <a:xfrm rot="5400000" flipV="1">
-              <a:off x="4438472" y="951524"/>
-              <a:ext cx="3" cy="1400378"/>
-            </a:xfrm>
-            <a:prstGeom prst="line">
-              <a:avLst/>
-            </a:prstGeom>
-            <a:ln w="19050"/>
-          </p:spPr>
-          <p:style>
-            <a:lnRef idx="3">
-              <a:schemeClr val="dk1"/>
-            </a:lnRef>
-            <a:fillRef idx="0">
-              <a:schemeClr val="dk1"/>
-            </a:fillRef>
-            <a:effectRef idx="2">
-              <a:schemeClr val="dk1"/>
-            </a:effectRef>
-            <a:fontRef idx="minor">
-              <a:schemeClr val="tx1"/>
-            </a:fontRef>
-          </p:style>
-        </p:cxnSp>
-        <p:sp>
-          <p:nvSpPr>
-            <p:cNvPr id="113" name="Diamond 112">
-              <a:extLst>
-                <a:ext uri="{FF2B5EF4-FFF2-40B4-BE49-F238E27FC236}">
-                  <a16:creationId xmlns:a16="http://schemas.microsoft.com/office/drawing/2014/main" id="{0BD4C7E8-159E-4FB1-B1A4-B3BA51F1CEA0}"/>
-                </a:ext>
-              </a:extLst>
-            </p:cNvPr>
-            <p:cNvSpPr/>
-            <p:nvPr/>
-          </p:nvSpPr>
-          <p:spPr>
-            <a:xfrm>
-              <a:off x="5138675" y="1428895"/>
-              <a:ext cx="471055" cy="445634"/>
-            </a:xfrm>
-            <a:prstGeom prst="diamond">
-              <a:avLst/>
-            </a:prstGeom>
-          </p:spPr>
-          <p:style>
-            <a:lnRef idx="2">
-              <a:schemeClr val="dk1">
-                <a:shade val="50000"/>
-              </a:schemeClr>
-            </a:lnRef>
-            <a:fillRef idx="1">
-              <a:schemeClr val="dk1"/>
-            </a:fillRef>
-            <a:effectRef idx="0">
-              <a:schemeClr val="dk1"/>
-            </a:effectRef>
-            <a:fontRef idx="minor">
-              <a:schemeClr val="lt1"/>
-            </a:fontRef>
-          </p:style>
-          <p:txBody>
-            <a:bodyPr rtlCol="0" anchor="ctr"/>
-            <a:lstStyle/>
-            <a:p>
-              <a:pPr algn="ctr"/>
-              <a:endParaRPr lang="en-US"/>
-            </a:p>
-          </p:txBody>
-        </p:sp>
-      </p:grpSp>
-      <p:cxnSp>
-        <p:nvCxnSpPr>
-          <p:cNvPr id="129" name="Straight Connector 128">
-            <a:extLst>
-              <a:ext uri="{FF2B5EF4-FFF2-40B4-BE49-F238E27FC236}">
-                <a16:creationId xmlns:a16="http://schemas.microsoft.com/office/drawing/2014/main" id="{275FC8D2-2F78-4CDD-BF72-828E8242EBE8}"/>
-              </a:ext>
-            </a:extLst>
-          </p:cNvPr>
-          <p:cNvCxnSpPr>
-            <a:cxnSpLocks/>
-          </p:cNvCxnSpPr>
-          <p:nvPr/>
-        </p:nvCxnSpPr>
-        <p:spPr>
-          <a:xfrm flipV="1">
-            <a:off x="5415766" y="5403872"/>
-            <a:ext cx="0" cy="743923"/>
-          </a:xfrm>
-          <a:prstGeom prst="line">
-            <a:avLst/>
-          </a:prstGeom>
-          <a:ln w="19050"/>
-        </p:spPr>
-        <p:style>
-          <a:lnRef idx="3">
-            <a:schemeClr val="dk1"/>
-          </a:lnRef>
-          <a:fillRef idx="0">
-            <a:schemeClr val="dk1"/>
-          </a:fillRef>
-          <a:effectRef idx="2">
-            <a:schemeClr val="dk1"/>
-          </a:effectRef>
-          <a:fontRef idx="minor">
-            <a:schemeClr val="tx1"/>
-          </a:fontRef>
-        </p:style>
-      </p:cxnSp>
-      <p:cxnSp>
-        <p:nvCxnSpPr>
-          <p:cNvPr id="131" name="Straight Connector 130">
-            <a:extLst>
-              <a:ext uri="{FF2B5EF4-FFF2-40B4-BE49-F238E27FC236}">
-                <a16:creationId xmlns:a16="http://schemas.microsoft.com/office/drawing/2014/main" id="{6C2B59F2-8CC8-4693-86EC-C479A508AE5A}"/>
-              </a:ext>
-            </a:extLst>
-          </p:cNvPr>
-          <p:cNvCxnSpPr>
-            <a:cxnSpLocks/>
-          </p:cNvCxnSpPr>
-          <p:nvPr/>
-        </p:nvCxnSpPr>
-        <p:spPr>
-          <a:xfrm flipV="1">
-            <a:off x="6991515" y="5403872"/>
-            <a:ext cx="0" cy="743923"/>
-          </a:xfrm>
-          <a:prstGeom prst="line">
-            <a:avLst/>
-          </a:prstGeom>
-          <a:ln w="19050"/>
-        </p:spPr>
-        <p:style>
-          <a:lnRef idx="3">
-            <a:schemeClr val="dk1"/>
-          </a:lnRef>
-          <a:fillRef idx="0">
-            <a:schemeClr val="dk1"/>
-          </a:fillRef>
-          <a:effectRef idx="2">
-            <a:schemeClr val="dk1"/>
-          </a:effectRef>
-          <a:fontRef idx="minor">
-            <a:schemeClr val="tx1"/>
-          </a:fontRef>
-        </p:style>
-      </p:cxnSp>
-      <p:cxnSp>
-        <p:nvCxnSpPr>
-          <p:cNvPr id="134" name="Straight Connector 133">
-            <a:extLst>
-              <a:ext uri="{FF2B5EF4-FFF2-40B4-BE49-F238E27FC236}">
-                <a16:creationId xmlns:a16="http://schemas.microsoft.com/office/drawing/2014/main" id="{3BB50A38-067B-46D1-861C-6FDAB8A2465E}"/>
-              </a:ext>
-            </a:extLst>
-          </p:cNvPr>
-          <p:cNvCxnSpPr>
-            <a:cxnSpLocks/>
-          </p:cNvCxnSpPr>
-          <p:nvPr/>
-        </p:nvCxnSpPr>
-        <p:spPr>
-          <a:xfrm flipH="1" flipV="1">
-            <a:off x="9544605" y="1820968"/>
-            <a:ext cx="1971666" cy="5452"/>
-          </a:xfrm>
-          <a:prstGeom prst="line">
-            <a:avLst/>
-          </a:prstGeom>
-          <a:ln w="19050"/>
-        </p:spPr>
-        <p:style>
-          <a:lnRef idx="3">
-            <a:schemeClr val="dk1"/>
-          </a:lnRef>
-          <a:fillRef idx="0">
-            <a:schemeClr val="dk1"/>
-          </a:fillRef>
-          <a:effectRef idx="2">
-            <a:schemeClr val="dk1"/>
-          </a:effectRef>
-          <a:fontRef idx="minor">
-            <a:schemeClr val="tx1"/>
-          </a:fontRef>
-        </p:style>
-      </p:cxnSp>
-      <p:cxnSp>
-        <p:nvCxnSpPr>
-          <p:cNvPr id="135" name="Straight Connector 134">
-            <a:extLst>
-              <a:ext uri="{FF2B5EF4-FFF2-40B4-BE49-F238E27FC236}">
-                <a16:creationId xmlns:a16="http://schemas.microsoft.com/office/drawing/2014/main" id="{1E3D7013-27AB-46F4-B0DF-CA56269D8F16}"/>
-              </a:ext>
-            </a:extLst>
-          </p:cNvPr>
-          <p:cNvCxnSpPr>
-            <a:cxnSpLocks/>
-          </p:cNvCxnSpPr>
-          <p:nvPr/>
-        </p:nvCxnSpPr>
-        <p:spPr>
-          <a:xfrm flipV="1">
-            <a:off x="11516271" y="1820969"/>
-            <a:ext cx="0" cy="2969859"/>
-          </a:xfrm>
-          <a:prstGeom prst="line">
-            <a:avLst/>
-          </a:prstGeom>
-          <a:ln w="19050"/>
-        </p:spPr>
-        <p:style>
-          <a:lnRef idx="3">
-            <a:schemeClr val="dk1"/>
-          </a:lnRef>
-          <a:fillRef idx="0">
-            <a:schemeClr val="dk1"/>
-          </a:fillRef>
-          <a:effectRef idx="2">
-            <a:schemeClr val="dk1"/>
-          </a:effectRef>
-          <a:fontRef idx="minor">
-            <a:schemeClr val="tx1"/>
-          </a:fontRef>
-        </p:style>
-      </p:cxnSp>
-      <p:cxnSp>
-        <p:nvCxnSpPr>
-          <p:cNvPr id="144" name="Straight Connector 143">
-            <a:extLst>
-              <a:ext uri="{FF2B5EF4-FFF2-40B4-BE49-F238E27FC236}">
-                <a16:creationId xmlns:a16="http://schemas.microsoft.com/office/drawing/2014/main" id="{6AF94CC2-84F6-485B-BB43-A2C4395F17C4}"/>
-              </a:ext>
-            </a:extLst>
-          </p:cNvPr>
-          <p:cNvCxnSpPr>
-            <a:cxnSpLocks/>
-          </p:cNvCxnSpPr>
-          <p:nvPr/>
-        </p:nvCxnSpPr>
-        <p:spPr>
-          <a:xfrm flipH="1" flipV="1">
-            <a:off x="7284067" y="4781329"/>
-            <a:ext cx="4232204" cy="9499"/>
-          </a:xfrm>
-          <a:prstGeom prst="line">
-            <a:avLst/>
-          </a:prstGeom>
-          <a:ln w="19050"/>
-        </p:spPr>
-        <p:style>
-          <a:lnRef idx="3">
-            <a:schemeClr val="dk1"/>
-          </a:lnRef>
-          <a:fillRef idx="0">
-            <a:schemeClr val="dk1"/>
-          </a:fillRef>
-          <a:effectRef idx="2">
-            <a:schemeClr val="dk1"/>
-          </a:effectRef>
-          <a:fontRef idx="minor">
-            <a:schemeClr val="tx1"/>
-          </a:fontRef>
-        </p:style>
-      </p:cxnSp>
-      <p:sp>
-        <p:nvSpPr>
-          <p:cNvPr id="149" name="TextBox 148">
-            <a:extLst>
-              <a:ext uri="{FF2B5EF4-FFF2-40B4-BE49-F238E27FC236}">
-                <a16:creationId xmlns:a16="http://schemas.microsoft.com/office/drawing/2014/main" id="{88EE3B53-180F-425F-9579-7468087F92FC}"/>
-              </a:ext>
-            </a:extLst>
-          </p:cNvPr>
-          <p:cNvSpPr txBox="1"/>
-          <p:nvPr/>
-        </p:nvSpPr>
-        <p:spPr>
-          <a:xfrm>
-            <a:off x="6096000" y="1451636"/>
-            <a:ext cx="691215" cy="369332"/>
-          </a:xfrm>
-          <a:prstGeom prst="rect">
-            <a:avLst/>
-          </a:prstGeom>
-          <a:noFill/>
-        </p:spPr>
-        <p:txBody>
-          <a:bodyPr wrap="none" rtlCol="0">
-            <a:spAutoFit/>
-          </a:bodyPr>
-          <a:lstStyle/>
-          <a:p>
-            <a:r>
-              <a:rPr lang="en-US" dirty="0"/>
-              <a:t>1..*</a:t>
-            </a:r>
-          </a:p>
-        </p:txBody>
-      </p:sp>
-      <p:sp>
-        <p:nvSpPr>
-          <p:cNvPr id="150" name="TextBox 149">
-            <a:extLst>
-              <a:ext uri="{FF2B5EF4-FFF2-40B4-BE49-F238E27FC236}">
-                <a16:creationId xmlns:a16="http://schemas.microsoft.com/office/drawing/2014/main" id="{FD23C045-B462-49FB-8FE4-FD6CDE9D7819}"/>
-              </a:ext>
-            </a:extLst>
-          </p:cNvPr>
-          <p:cNvSpPr txBox="1"/>
-          <p:nvPr/>
-        </p:nvSpPr>
-        <p:spPr>
-          <a:xfrm>
-            <a:off x="8047418" y="3756861"/>
-            <a:ext cx="311304" cy="369332"/>
-          </a:xfrm>
-          <a:prstGeom prst="rect">
-            <a:avLst/>
-          </a:prstGeom>
-          <a:noFill/>
-        </p:spPr>
-        <p:txBody>
-          <a:bodyPr wrap="none" rtlCol="0">
-            <a:spAutoFit/>
-          </a:bodyPr>
-          <a:lstStyle/>
-          <a:p>
-            <a:r>
-              <a:rPr lang="en-US" dirty="0"/>
-              <a:t>1</a:t>
-            </a:r>
-          </a:p>
-        </p:txBody>
-      </p:sp>
-      <p:sp>
-        <p:nvSpPr>
-          <p:cNvPr id="151" name="TextBox 150">
-            <a:extLst>
-              <a:ext uri="{FF2B5EF4-FFF2-40B4-BE49-F238E27FC236}">
-                <a16:creationId xmlns:a16="http://schemas.microsoft.com/office/drawing/2014/main" id="{2DFE955C-5636-4D9E-8005-A634DB336202}"/>
-              </a:ext>
-            </a:extLst>
-          </p:cNvPr>
-          <p:cNvSpPr txBox="1"/>
-          <p:nvPr/>
-        </p:nvSpPr>
-        <p:spPr>
-          <a:xfrm>
-            <a:off x="5578763" y="3231303"/>
-            <a:ext cx="311304" cy="369332"/>
-          </a:xfrm>
-          <a:prstGeom prst="rect">
-            <a:avLst/>
-          </a:prstGeom>
-          <a:noFill/>
-        </p:spPr>
-        <p:txBody>
-          <a:bodyPr wrap="none" rtlCol="0">
-            <a:spAutoFit/>
-          </a:bodyPr>
-          <a:lstStyle/>
-          <a:p>
-            <a:r>
-              <a:rPr lang="en-US" dirty="0"/>
-              <a:t>1</a:t>
-            </a:r>
-          </a:p>
-        </p:txBody>
-      </p:sp>
-      <p:sp>
-        <p:nvSpPr>
-          <p:cNvPr id="152" name="TextBox 151">
-            <a:extLst>
-              <a:ext uri="{FF2B5EF4-FFF2-40B4-BE49-F238E27FC236}">
-                <a16:creationId xmlns:a16="http://schemas.microsoft.com/office/drawing/2014/main" id="{76ED82CF-32F7-4084-8C3D-86453CD173BC}"/>
-              </a:ext>
-            </a:extLst>
-          </p:cNvPr>
-          <p:cNvSpPr txBox="1"/>
-          <p:nvPr/>
-        </p:nvSpPr>
-        <p:spPr>
-          <a:xfrm>
-            <a:off x="1289416" y="4274042"/>
-            <a:ext cx="691215" cy="369332"/>
-          </a:xfrm>
-          <a:prstGeom prst="rect">
-            <a:avLst/>
-          </a:prstGeom>
-          <a:noFill/>
-        </p:spPr>
-        <p:txBody>
-          <a:bodyPr wrap="none" rtlCol="0">
-            <a:spAutoFit/>
-          </a:bodyPr>
-          <a:lstStyle/>
-          <a:p>
-            <a:r>
-              <a:rPr lang="en-US" dirty="0"/>
-              <a:t>0..*</a:t>
-            </a:r>
-          </a:p>
-        </p:txBody>
-      </p:sp>
-      <p:sp>
-        <p:nvSpPr>
-          <p:cNvPr id="153" name="TextBox 152">
-            <a:extLst>
-              <a:ext uri="{FF2B5EF4-FFF2-40B4-BE49-F238E27FC236}">
-                <a16:creationId xmlns:a16="http://schemas.microsoft.com/office/drawing/2014/main" id="{5DD45F85-AF48-4489-A138-E0A575666338}"/>
-              </a:ext>
-            </a:extLst>
-          </p:cNvPr>
-          <p:cNvSpPr txBox="1"/>
-          <p:nvPr/>
-        </p:nvSpPr>
-        <p:spPr>
-          <a:xfrm>
-            <a:off x="4336300" y="4570192"/>
-            <a:ext cx="691215" cy="369332"/>
-          </a:xfrm>
-          <a:prstGeom prst="rect">
-            <a:avLst/>
-          </a:prstGeom>
-          <a:noFill/>
-        </p:spPr>
-        <p:txBody>
-          <a:bodyPr wrap="none" rtlCol="0">
-            <a:spAutoFit/>
-          </a:bodyPr>
-          <a:lstStyle/>
-          <a:p>
-            <a:r>
-              <a:rPr lang="en-US" dirty="0"/>
-              <a:t>1..*</a:t>
-            </a:r>
-          </a:p>
-        </p:txBody>
-      </p:sp>
-      <p:sp>
-        <p:nvSpPr>
-          <p:cNvPr id="154" name="TextBox 153">
-            <a:extLst>
-              <a:ext uri="{FF2B5EF4-FFF2-40B4-BE49-F238E27FC236}">
-                <a16:creationId xmlns:a16="http://schemas.microsoft.com/office/drawing/2014/main" id="{AC4AA986-44BC-4DF8-9AE9-AB907772F4BA}"/>
-              </a:ext>
-            </a:extLst>
-          </p:cNvPr>
-          <p:cNvSpPr txBox="1"/>
-          <p:nvPr/>
-        </p:nvSpPr>
-        <p:spPr>
-          <a:xfrm>
-            <a:off x="3356894" y="6099940"/>
-            <a:ext cx="311304" cy="369332"/>
-          </a:xfrm>
-          <a:prstGeom prst="rect">
-            <a:avLst/>
-          </a:prstGeom>
-          <a:noFill/>
-        </p:spPr>
-        <p:txBody>
-          <a:bodyPr wrap="none" rtlCol="0">
-            <a:spAutoFit/>
-          </a:bodyPr>
-          <a:lstStyle/>
-          <a:p>
-            <a:r>
-              <a:rPr lang="en-US" dirty="0"/>
-              <a:t>1</a:t>
-            </a:r>
-          </a:p>
-        </p:txBody>
-      </p:sp>
-      <p:sp>
-        <p:nvSpPr>
-          <p:cNvPr id="155" name="TextBox 154">
-            <a:extLst>
-              <a:ext uri="{FF2B5EF4-FFF2-40B4-BE49-F238E27FC236}">
-                <a16:creationId xmlns:a16="http://schemas.microsoft.com/office/drawing/2014/main" id="{7A103E0C-3D36-4AEC-BB35-D7FA02A37770}"/>
-              </a:ext>
-            </a:extLst>
-          </p:cNvPr>
-          <p:cNvSpPr txBox="1"/>
-          <p:nvPr/>
-        </p:nvSpPr>
-        <p:spPr>
-          <a:xfrm>
-            <a:off x="7536891" y="5033224"/>
-            <a:ext cx="311304" cy="369332"/>
-          </a:xfrm>
-          <a:prstGeom prst="rect">
-            <a:avLst/>
-          </a:prstGeom>
-          <a:noFill/>
-        </p:spPr>
-        <p:txBody>
-          <a:bodyPr wrap="none" rtlCol="0">
-            <a:spAutoFit/>
-          </a:bodyPr>
-          <a:lstStyle/>
-          <a:p>
-            <a:r>
-              <a:rPr lang="en-US" dirty="0"/>
-              <a:t>1</a:t>
-            </a:r>
-          </a:p>
-        </p:txBody>
-      </p:sp>
-      <p:sp>
-        <p:nvSpPr>
-          <p:cNvPr id="156" name="TextBox 155">
-            <a:extLst>
-              <a:ext uri="{FF2B5EF4-FFF2-40B4-BE49-F238E27FC236}">
-                <a16:creationId xmlns:a16="http://schemas.microsoft.com/office/drawing/2014/main" id="{DDB9DD97-9668-4A91-A447-A4B17FD83FC1}"/>
-              </a:ext>
-            </a:extLst>
-          </p:cNvPr>
-          <p:cNvSpPr txBox="1"/>
-          <p:nvPr/>
-        </p:nvSpPr>
-        <p:spPr>
-          <a:xfrm>
-            <a:off x="7328037" y="4418467"/>
-            <a:ext cx="691215" cy="369332"/>
-          </a:xfrm>
-          <a:prstGeom prst="rect">
-            <a:avLst/>
-          </a:prstGeom>
-          <a:noFill/>
-        </p:spPr>
-        <p:txBody>
-          <a:bodyPr wrap="none" rtlCol="0">
-            <a:spAutoFit/>
-          </a:bodyPr>
-          <a:lstStyle/>
-          <a:p>
-            <a:r>
-              <a:rPr lang="en-US" dirty="0"/>
-              <a:t>0..*</a:t>
-            </a:r>
-          </a:p>
-        </p:txBody>
-      </p:sp>
-      <p:sp>
-        <p:nvSpPr>
-          <p:cNvPr id="157" name="TextBox 156">
-            <a:extLst>
-              <a:ext uri="{FF2B5EF4-FFF2-40B4-BE49-F238E27FC236}">
-                <a16:creationId xmlns:a16="http://schemas.microsoft.com/office/drawing/2014/main" id="{1D7333F5-0FDC-4455-B219-5AEEBD9B1F86}"/>
-              </a:ext>
-            </a:extLst>
-          </p:cNvPr>
-          <p:cNvSpPr txBox="1"/>
-          <p:nvPr/>
-        </p:nvSpPr>
-        <p:spPr>
-          <a:xfrm>
-            <a:off x="9558379" y="1451636"/>
-            <a:ext cx="311304" cy="369332"/>
-          </a:xfrm>
-          <a:prstGeom prst="rect">
-            <a:avLst/>
-          </a:prstGeom>
-          <a:noFill/>
-        </p:spPr>
-        <p:txBody>
-          <a:bodyPr wrap="none" rtlCol="0">
-            <a:spAutoFit/>
-          </a:bodyPr>
-          <a:lstStyle/>
-          <a:p>
-            <a:r>
-              <a:rPr lang="en-US" dirty="0"/>
-              <a:t>1</a:t>
-            </a:r>
-          </a:p>
-        </p:txBody>
-      </p:sp>
-      <p:sp>
-        <p:nvSpPr>
-          <p:cNvPr id="165" name="Isosceles Triangle 164">
-            <a:extLst>
-              <a:ext uri="{FF2B5EF4-FFF2-40B4-BE49-F238E27FC236}">
-                <a16:creationId xmlns:a16="http://schemas.microsoft.com/office/drawing/2014/main" id="{9D1E83B2-5486-44F8-98E8-75DC10E6D9DF}"/>
-              </a:ext>
-            </a:extLst>
-          </p:cNvPr>
-          <p:cNvSpPr/>
-          <p:nvPr/>
-        </p:nvSpPr>
-        <p:spPr>
-          <a:xfrm rot="16200000">
-            <a:off x="4204493" y="3360237"/>
-            <a:ext cx="129037" cy="158117"/>
-          </a:xfrm>
-          <a:prstGeom prst="triangle">
-            <a:avLst/>
-          </a:prstGeom>
-          <a:solidFill>
-            <a:schemeClr val="tx1"/>
-          </a:solidFill>
-        </p:spPr>
-        <p:style>
-          <a:lnRef idx="2">
-            <a:schemeClr val="accent1">
-              <a:shade val="50000"/>
-            </a:schemeClr>
-          </a:lnRef>
-          <a:fillRef idx="1">
-            <a:schemeClr val="accent1"/>
-          </a:fillRef>
-          <a:effectRef idx="0">
-            <a:schemeClr val="accent1"/>
-          </a:effectRef>
-          <a:fontRef idx="minor">
-            <a:schemeClr val="lt1"/>
-          </a:fontRef>
-        </p:style>
-        <p:txBody>
-          <a:bodyPr rtlCol="0" anchor="ctr"/>
-          <a:lstStyle/>
-          <a:p>
-            <a:pPr algn="ctr"/>
-            <a:endParaRPr lang="en-US" dirty="0">
-              <a:latin typeface="Consolas" panose="020B0609020204030204" pitchFamily="49" charset="0"/>
-            </a:endParaRPr>
-          </a:p>
-        </p:txBody>
-      </p:sp>
-      <p:sp>
-        <p:nvSpPr>
-          <p:cNvPr id="166" name="TextBox 165">
-            <a:extLst>
-              <a:ext uri="{FF2B5EF4-FFF2-40B4-BE49-F238E27FC236}">
-                <a16:creationId xmlns:a16="http://schemas.microsoft.com/office/drawing/2014/main" id="{AF847EA1-2264-45C2-8C97-4F5CE03CBC3E}"/>
-              </a:ext>
-            </a:extLst>
-          </p:cNvPr>
-          <p:cNvSpPr txBox="1"/>
-          <p:nvPr/>
-        </p:nvSpPr>
-        <p:spPr>
-          <a:xfrm>
-            <a:off x="4302943" y="3288642"/>
-            <a:ext cx="949299" cy="276999"/>
-          </a:xfrm>
-          <a:prstGeom prst="rect">
-            <a:avLst/>
-          </a:prstGeom>
-          <a:noFill/>
-        </p:spPr>
-        <p:txBody>
-          <a:bodyPr wrap="none" rtlCol="0">
-            <a:spAutoFit/>
-          </a:bodyPr>
-          <a:lstStyle/>
-          <a:p>
-            <a:r>
-              <a:rPr lang="en-US" sz="1200" dirty="0"/>
-              <a:t>Moderates</a:t>
-            </a:r>
-          </a:p>
-        </p:txBody>
-      </p:sp>
-      <p:sp>
-        <p:nvSpPr>
-          <p:cNvPr id="168" name="TextBox 167">
-            <a:extLst>
-              <a:ext uri="{FF2B5EF4-FFF2-40B4-BE49-F238E27FC236}">
-                <a16:creationId xmlns:a16="http://schemas.microsoft.com/office/drawing/2014/main" id="{7AB8A025-0C36-489F-A1EE-188F3B5B7A84}"/>
-              </a:ext>
-            </a:extLst>
-          </p:cNvPr>
-          <p:cNvSpPr txBox="1"/>
-          <p:nvPr/>
-        </p:nvSpPr>
-        <p:spPr>
-          <a:xfrm>
-            <a:off x="4461060" y="3808588"/>
-            <a:ext cx="524503" cy="276999"/>
-          </a:xfrm>
-          <a:prstGeom prst="rect">
-            <a:avLst/>
-          </a:prstGeom>
-          <a:noFill/>
-        </p:spPr>
-        <p:txBody>
-          <a:bodyPr wrap="none" rtlCol="0">
-            <a:spAutoFit/>
-          </a:bodyPr>
-          <a:lstStyle/>
-          <a:p>
-            <a:r>
-              <a:rPr lang="en-US" sz="1200" dirty="0"/>
-              <a:t>Owns</a:t>
-            </a:r>
-          </a:p>
-        </p:txBody>
-      </p:sp>
-      <p:sp>
-        <p:nvSpPr>
-          <p:cNvPr id="171" name="Isosceles Triangle 170">
-            <a:extLst>
-              <a:ext uri="{FF2B5EF4-FFF2-40B4-BE49-F238E27FC236}">
-                <a16:creationId xmlns:a16="http://schemas.microsoft.com/office/drawing/2014/main" id="{D7F4C7A0-6388-4F5C-AE83-4BFE50FFADC9}"/>
-              </a:ext>
-            </a:extLst>
-          </p:cNvPr>
-          <p:cNvSpPr/>
-          <p:nvPr/>
-        </p:nvSpPr>
-        <p:spPr>
-          <a:xfrm rot="16200000">
-            <a:off x="4362610" y="3863154"/>
-            <a:ext cx="129037" cy="158117"/>
-          </a:xfrm>
-          <a:prstGeom prst="triangle">
-            <a:avLst/>
-          </a:prstGeom>
-          <a:solidFill>
-            <a:schemeClr val="tx1"/>
-          </a:solidFill>
-        </p:spPr>
-        <p:style>
-          <a:lnRef idx="2">
-            <a:schemeClr val="accent1">
-              <a:shade val="50000"/>
-            </a:schemeClr>
-          </a:lnRef>
-          <a:fillRef idx="1">
-            <a:schemeClr val="accent1"/>
-          </a:fillRef>
-          <a:effectRef idx="0">
-            <a:schemeClr val="accent1"/>
-          </a:effectRef>
-          <a:fontRef idx="minor">
-            <a:schemeClr val="lt1"/>
-          </a:fontRef>
-        </p:style>
-        <p:txBody>
-          <a:bodyPr rtlCol="0" anchor="ctr"/>
-          <a:lstStyle/>
-          <a:p>
-            <a:pPr algn="ctr"/>
-            <a:endParaRPr lang="en-US" dirty="0">
-              <a:latin typeface="Consolas" panose="020B0609020204030204" pitchFamily="49" charset="0"/>
-            </a:endParaRPr>
-          </a:p>
-        </p:txBody>
-      </p:sp>
-      <p:sp>
-        <p:nvSpPr>
-          <p:cNvPr id="173" name="TextBox 172">
-            <a:extLst>
-              <a:ext uri="{FF2B5EF4-FFF2-40B4-BE49-F238E27FC236}">
-                <a16:creationId xmlns:a16="http://schemas.microsoft.com/office/drawing/2014/main" id="{EA5E31FF-E195-4A1A-8F77-23DBD870A1B9}"/>
-              </a:ext>
-            </a:extLst>
-          </p:cNvPr>
-          <p:cNvSpPr txBox="1"/>
-          <p:nvPr/>
-        </p:nvSpPr>
-        <p:spPr>
-          <a:xfrm>
-            <a:off x="8187372" y="1170639"/>
-            <a:ext cx="691215" cy="369332"/>
-          </a:xfrm>
-          <a:prstGeom prst="rect">
-            <a:avLst/>
-          </a:prstGeom>
-          <a:noFill/>
-        </p:spPr>
-        <p:txBody>
-          <a:bodyPr wrap="none" rtlCol="0">
-            <a:spAutoFit/>
-          </a:bodyPr>
-          <a:lstStyle/>
-          <a:p>
-            <a:r>
-              <a:rPr lang="en-US" dirty="0"/>
-              <a:t>0..*</a:t>
-            </a:r>
-          </a:p>
-        </p:txBody>
-      </p:sp>
-      <p:sp>
-        <p:nvSpPr>
-          <p:cNvPr id="174" name="TextBox 173">
-            <a:extLst>
-              <a:ext uri="{FF2B5EF4-FFF2-40B4-BE49-F238E27FC236}">
-                <a16:creationId xmlns:a16="http://schemas.microsoft.com/office/drawing/2014/main" id="{3C38E085-3DB8-4379-9897-96DF95F32D84}"/>
-              </a:ext>
-            </a:extLst>
-          </p:cNvPr>
-          <p:cNvSpPr txBox="1"/>
-          <p:nvPr/>
-        </p:nvSpPr>
-        <p:spPr>
-          <a:xfrm>
-            <a:off x="7561563" y="449693"/>
-            <a:ext cx="311304" cy="369332"/>
-          </a:xfrm>
-          <a:prstGeom prst="rect">
-            <a:avLst/>
-          </a:prstGeom>
-          <a:noFill/>
-        </p:spPr>
-        <p:txBody>
-          <a:bodyPr wrap="none" rtlCol="0">
-            <a:spAutoFit/>
-          </a:bodyPr>
-          <a:lstStyle/>
-          <a:p>
-            <a:r>
-              <a:rPr lang="en-US" dirty="0"/>
-              <a:t>1</a:t>
-            </a:r>
-          </a:p>
-        </p:txBody>
-      </p:sp>
-      <mc:AlternateContent xmlns:mc="http://schemas.openxmlformats.org/markup-compatibility/2006" xmlns:p14="http://schemas.microsoft.com/office/powerpoint/2010/main">
-        <mc:Choice Requires="p14">
-          <p:contentPart p14:bwMode="auto" r:id="rId2">
-            <p14:nvContentPartPr>
-              <p14:cNvPr id="2" name="Ink 1">
-                <a:extLst>
-                  <a:ext uri="{FF2B5EF4-FFF2-40B4-BE49-F238E27FC236}">
-                    <a16:creationId xmlns:a16="http://schemas.microsoft.com/office/drawing/2014/main" id="{3A91F00C-6803-434E-A6EE-212C37926217}"/>
-                  </a:ext>
-                </a:extLst>
-              </p14:cNvPr>
-              <p14:cNvContentPartPr/>
-              <p14:nvPr/>
-            </p14:nvContentPartPr>
-            <p14:xfrm>
-              <a:off x="7180742" y="2293616"/>
-              <a:ext cx="324360" cy="208440"/>
-            </p14:xfrm>
-          </p:contentPart>
-        </mc:Choice>
-        <mc:Fallback xmlns="">
-          <p:pic>
-            <p:nvPicPr>
-              <p:cNvPr id="2" name="Ink 1">
-                <a:extLst>
-                  <a:ext uri="{FF2B5EF4-FFF2-40B4-BE49-F238E27FC236}">
-                    <a16:creationId xmlns:a16="http://schemas.microsoft.com/office/drawing/2014/main" id="{3A91F00C-6803-434E-A6EE-212C37926217}"/>
-                  </a:ext>
-                </a:extLst>
-              </p:cNvPr>
-              <p:cNvPicPr/>
-              <p:nvPr/>
-            </p:nvPicPr>
-            <p:blipFill>
-              <a:blip r:embed="rId3"/>
-              <a:stretch>
-                <a:fillRect/>
-              </a:stretch>
-            </p:blipFill>
-            <p:spPr>
-              <a:xfrm>
-                <a:off x="7171742" y="2284976"/>
-                <a:ext cx="342000" cy="226080"/>
-              </a:xfrm>
-              <a:prstGeom prst="rect">
-                <a:avLst/>
-              </a:prstGeom>
-            </p:spPr>
-          </p:pic>
-        </mc:Fallback>
-      </mc:AlternateContent>
-      <mc:AlternateContent xmlns:mc="http://schemas.openxmlformats.org/markup-compatibility/2006" xmlns:p14="http://schemas.microsoft.com/office/powerpoint/2010/main">
-        <mc:Choice Requires="p14">
-          <p:contentPart p14:bwMode="auto" r:id="rId4">
-            <p14:nvContentPartPr>
-              <p14:cNvPr id="3" name="Ink 2">
-                <a:extLst>
-                  <a:ext uri="{FF2B5EF4-FFF2-40B4-BE49-F238E27FC236}">
-                    <a16:creationId xmlns:a16="http://schemas.microsoft.com/office/drawing/2014/main" id="{2458E4AA-7F03-452C-8EB7-C016404902EB}"/>
-                  </a:ext>
-                </a:extLst>
-              </p14:cNvPr>
-              <p14:cNvContentPartPr/>
-              <p14:nvPr/>
-            </p14:nvContentPartPr>
-            <p14:xfrm>
-              <a:off x="8900462" y="2270576"/>
-              <a:ext cx="459360" cy="166680"/>
-            </p14:xfrm>
-          </p:contentPart>
-        </mc:Choice>
-        <mc:Fallback xmlns="">
-          <p:pic>
-            <p:nvPicPr>
-              <p:cNvPr id="3" name="Ink 2">
-                <a:extLst>
-                  <a:ext uri="{FF2B5EF4-FFF2-40B4-BE49-F238E27FC236}">
-                    <a16:creationId xmlns:a16="http://schemas.microsoft.com/office/drawing/2014/main" id="{2458E4AA-7F03-452C-8EB7-C016404902EB}"/>
-                  </a:ext>
-                </a:extLst>
-              </p:cNvPr>
-              <p:cNvPicPr/>
-              <p:nvPr/>
-            </p:nvPicPr>
-            <p:blipFill>
-              <a:blip r:embed="rId5"/>
-              <a:stretch>
-                <a:fillRect/>
-              </a:stretch>
-            </p:blipFill>
-            <p:spPr>
-              <a:xfrm>
-                <a:off x="8891462" y="2261576"/>
-                <a:ext cx="477000" cy="184320"/>
-              </a:xfrm>
-              <a:prstGeom prst="rect">
-                <a:avLst/>
-              </a:prstGeom>
-            </p:spPr>
-          </p:pic>
-        </mc:Fallback>
-      </mc:AlternateContent>
-      <mc:AlternateContent xmlns:mc="http://schemas.openxmlformats.org/markup-compatibility/2006" xmlns:p14="http://schemas.microsoft.com/office/powerpoint/2010/main">
-        <mc:Choice Requires="p14">
-          <p:contentPart p14:bwMode="auto" r:id="rId6">
-            <p14:nvContentPartPr>
-              <p14:cNvPr id="14" name="Ink 13">
-                <a:extLst>
-                  <a:ext uri="{FF2B5EF4-FFF2-40B4-BE49-F238E27FC236}">
-                    <a16:creationId xmlns:a16="http://schemas.microsoft.com/office/drawing/2014/main" id="{19981C74-C39F-48A1-B704-40C483977798}"/>
-                  </a:ext>
-                </a:extLst>
-              </p14:cNvPr>
-              <p14:cNvContentPartPr/>
-              <p14:nvPr/>
-            </p14:nvContentPartPr>
-            <p14:xfrm>
-              <a:off x="-310858" y="1996256"/>
-              <a:ext cx="360" cy="360"/>
-            </p14:xfrm>
-          </p:contentPart>
-        </mc:Choice>
-        <mc:Fallback xmlns="">
-          <p:pic>
-            <p:nvPicPr>
-              <p:cNvPr id="14" name="Ink 13">
-                <a:extLst>
-                  <a:ext uri="{FF2B5EF4-FFF2-40B4-BE49-F238E27FC236}">
-                    <a16:creationId xmlns:a16="http://schemas.microsoft.com/office/drawing/2014/main" id="{19981C74-C39F-48A1-B704-40C483977798}"/>
-                  </a:ext>
-                </a:extLst>
-              </p:cNvPr>
-              <p:cNvPicPr/>
-              <p:nvPr/>
-            </p:nvPicPr>
-            <p:blipFill>
-              <a:blip r:embed="rId7"/>
-              <a:stretch>
-                <a:fillRect/>
-              </a:stretch>
-            </p:blipFill>
-            <p:spPr>
-              <a:xfrm>
-                <a:off x="-319498" y="1987616"/>
-                <a:ext cx="18000" cy="18000"/>
-              </a:xfrm>
-              <a:prstGeom prst="rect">
-                <a:avLst/>
-              </a:prstGeom>
-            </p:spPr>
-          </p:pic>
-        </mc:Fallback>
-      </mc:AlternateContent>
-      <mc:AlternateContent xmlns:mc="http://schemas.openxmlformats.org/markup-compatibility/2006" xmlns:p14="http://schemas.microsoft.com/office/powerpoint/2010/main">
-        <mc:Choice Requires="p14">
-          <p:contentPart p14:bwMode="auto" r:id="rId8">
-            <p14:nvContentPartPr>
-              <p14:cNvPr id="16" name="Ink 15">
-                <a:extLst>
-                  <a:ext uri="{FF2B5EF4-FFF2-40B4-BE49-F238E27FC236}">
-                    <a16:creationId xmlns:a16="http://schemas.microsoft.com/office/drawing/2014/main" id="{EA0EC447-3D2C-4517-AF46-2C8900EF903B}"/>
-                  </a:ext>
-                </a:extLst>
-              </p14:cNvPr>
-              <p14:cNvContentPartPr/>
-              <p14:nvPr/>
-            </p14:nvContentPartPr>
-            <p14:xfrm>
-              <a:off x="6400262" y="4764656"/>
-              <a:ext cx="360" cy="360"/>
-            </p14:xfrm>
-          </p:contentPart>
-        </mc:Choice>
-        <mc:Fallback xmlns="">
-          <p:pic>
-            <p:nvPicPr>
-              <p:cNvPr id="16" name="Ink 15">
-                <a:extLst>
-                  <a:ext uri="{FF2B5EF4-FFF2-40B4-BE49-F238E27FC236}">
-                    <a16:creationId xmlns:a16="http://schemas.microsoft.com/office/drawing/2014/main" id="{EA0EC447-3D2C-4517-AF46-2C8900EF903B}"/>
-                  </a:ext>
-                </a:extLst>
-              </p:cNvPr>
-              <p:cNvPicPr/>
-              <p:nvPr/>
-            </p:nvPicPr>
-            <p:blipFill>
-              <a:blip r:embed="rId7"/>
-              <a:stretch>
-                <a:fillRect/>
-              </a:stretch>
-            </p:blipFill>
-            <p:spPr>
-              <a:xfrm>
-                <a:off x="6391622" y="4756016"/>
-                <a:ext cx="18000" cy="18000"/>
-              </a:xfrm>
-              <a:prstGeom prst="rect">
-                <a:avLst/>
-              </a:prstGeom>
-            </p:spPr>
-          </p:pic>
-        </mc:Fallback>
-      </mc:AlternateContent>
-      <mc:AlternateContent xmlns:mc="http://schemas.openxmlformats.org/markup-compatibility/2006" xmlns:p14="http://schemas.microsoft.com/office/powerpoint/2010/main">
-        <mc:Choice Requires="p14">
-          <p:contentPart p14:bwMode="auto" r:id="rId9">
-            <p14:nvContentPartPr>
-              <p14:cNvPr id="17" name="Ink 16">
-                <a:extLst>
-                  <a:ext uri="{FF2B5EF4-FFF2-40B4-BE49-F238E27FC236}">
-                    <a16:creationId xmlns:a16="http://schemas.microsoft.com/office/drawing/2014/main" id="{E744D069-612F-43C3-8AF1-8FD69487CCB5}"/>
-                  </a:ext>
-                </a:extLst>
-              </p14:cNvPr>
-              <p14:cNvContentPartPr/>
-              <p14:nvPr/>
-            </p14:nvContentPartPr>
-            <p14:xfrm>
-              <a:off x="6442382" y="4831616"/>
-              <a:ext cx="360" cy="360"/>
-            </p14:xfrm>
-          </p:contentPart>
-        </mc:Choice>
-        <mc:Fallback xmlns="">
-          <p:pic>
-            <p:nvPicPr>
-              <p:cNvPr id="17" name="Ink 16">
-                <a:extLst>
-                  <a:ext uri="{FF2B5EF4-FFF2-40B4-BE49-F238E27FC236}">
-                    <a16:creationId xmlns:a16="http://schemas.microsoft.com/office/drawing/2014/main" id="{E744D069-612F-43C3-8AF1-8FD69487CCB5}"/>
-                  </a:ext>
-                </a:extLst>
-              </p:cNvPr>
-              <p:cNvPicPr/>
-              <p:nvPr/>
-            </p:nvPicPr>
-            <p:blipFill>
-              <a:blip r:embed="rId7"/>
-              <a:stretch>
-                <a:fillRect/>
-              </a:stretch>
-            </p:blipFill>
-            <p:spPr>
-              <a:xfrm>
-                <a:off x="6433382" y="4822976"/>
-                <a:ext cx="18000" cy="18000"/>
-              </a:xfrm>
-              <a:prstGeom prst="rect">
-                <a:avLst/>
-              </a:prstGeom>
-            </p:spPr>
-          </p:pic>
-        </mc:Fallback>
-      </mc:AlternateContent>
-      <p:grpSp>
-        <p:nvGrpSpPr>
-          <p:cNvPr id="24" name="Group 23">
-            <a:extLst>
-              <a:ext uri="{FF2B5EF4-FFF2-40B4-BE49-F238E27FC236}">
-                <a16:creationId xmlns:a16="http://schemas.microsoft.com/office/drawing/2014/main" id="{9036C4F8-80CB-4EA1-8EC7-5DB0842DEA0A}"/>
-              </a:ext>
-            </a:extLst>
-          </p:cNvPr>
-          <p:cNvGrpSpPr/>
-          <p:nvPr/>
-        </p:nvGrpSpPr>
-        <p:grpSpPr>
-          <a:xfrm>
-            <a:off x="7734422" y="5016296"/>
-            <a:ext cx="142920" cy="17280"/>
-            <a:chOff x="7734422" y="5016296"/>
-            <a:chExt cx="142920" cy="17280"/>
-          </a:xfrm>
-        </p:grpSpPr>
-        <mc:AlternateContent xmlns:mc="http://schemas.openxmlformats.org/markup-compatibility/2006" xmlns:p14="http://schemas.microsoft.com/office/powerpoint/2010/main">
-          <mc:Choice Requires="p14">
-            <p:contentPart p14:bwMode="auto" r:id="rId10">
-              <p14:nvContentPartPr>
-                <p14:cNvPr id="18" name="Ink 17">
-                  <a:extLst>
-                    <a:ext uri="{FF2B5EF4-FFF2-40B4-BE49-F238E27FC236}">
-                      <a16:creationId xmlns:a16="http://schemas.microsoft.com/office/drawing/2014/main" id="{F3B1D764-DC15-408E-9549-35073C1318D9}"/>
-                    </a:ext>
-                  </a:extLst>
-                </p14:cNvPr>
-                <p14:cNvContentPartPr/>
-                <p14:nvPr/>
-              </p14:nvContentPartPr>
-              <p14:xfrm>
-                <a:off x="7734422" y="5016296"/>
-                <a:ext cx="360" cy="360"/>
-              </p14:xfrm>
-            </p:contentPart>
-          </mc:Choice>
-          <mc:Fallback xmlns="">
-            <p:pic>
-              <p:nvPicPr>
-                <p:cNvPr id="18" name="Ink 17">
-                  <a:extLst>
-                    <a:ext uri="{FF2B5EF4-FFF2-40B4-BE49-F238E27FC236}">
-                      <a16:creationId xmlns:a16="http://schemas.microsoft.com/office/drawing/2014/main" id="{F3B1D764-DC15-408E-9549-35073C1318D9}"/>
-                    </a:ext>
-                  </a:extLst>
-                </p:cNvPr>
-                <p:cNvPicPr/>
-                <p:nvPr/>
-              </p:nvPicPr>
-              <p:blipFill>
-                <a:blip r:embed="rId7"/>
-                <a:stretch>
-                  <a:fillRect/>
-                </a:stretch>
-              </p:blipFill>
-              <p:spPr>
-                <a:xfrm>
-                  <a:off x="7725422" y="5007656"/>
-                  <a:ext cx="18000" cy="18000"/>
-                </a:xfrm>
-                <a:prstGeom prst="rect">
-                  <a:avLst/>
-                </a:prstGeom>
-              </p:spPr>
-            </p:pic>
-          </mc:Fallback>
-        </mc:AlternateContent>
-        <mc:AlternateContent xmlns:mc="http://schemas.openxmlformats.org/markup-compatibility/2006" xmlns:p14="http://schemas.microsoft.com/office/powerpoint/2010/main">
-          <mc:Choice Requires="p14">
-            <p:contentPart p14:bwMode="auto" r:id="rId11">
-              <p14:nvContentPartPr>
-                <p14:cNvPr id="19" name="Ink 18">
-                  <a:extLst>
-                    <a:ext uri="{FF2B5EF4-FFF2-40B4-BE49-F238E27FC236}">
-                      <a16:creationId xmlns:a16="http://schemas.microsoft.com/office/drawing/2014/main" id="{9DEA60EE-E5EA-472D-9F64-C48FC322DD65}"/>
-                    </a:ext>
-                  </a:extLst>
-                </p14:cNvPr>
-                <p14:cNvContentPartPr/>
-                <p14:nvPr/>
-              </p14:nvContentPartPr>
-              <p14:xfrm>
-                <a:off x="7876982" y="5033216"/>
-                <a:ext cx="360" cy="360"/>
-              </p14:xfrm>
-            </p:contentPart>
-          </mc:Choice>
-          <mc:Fallback xmlns="">
-            <p:pic>
-              <p:nvPicPr>
-                <p:cNvPr id="19" name="Ink 18">
-                  <a:extLst>
-                    <a:ext uri="{FF2B5EF4-FFF2-40B4-BE49-F238E27FC236}">
-                      <a16:creationId xmlns:a16="http://schemas.microsoft.com/office/drawing/2014/main" id="{9DEA60EE-E5EA-472D-9F64-C48FC322DD65}"/>
-                    </a:ext>
-                  </a:extLst>
-                </p:cNvPr>
-                <p:cNvPicPr/>
-                <p:nvPr/>
-              </p:nvPicPr>
-              <p:blipFill>
-                <a:blip r:embed="rId7"/>
-                <a:stretch>
-                  <a:fillRect/>
-                </a:stretch>
-              </p:blipFill>
-              <p:spPr>
-                <a:xfrm>
-                  <a:off x="7868342" y="5024216"/>
-                  <a:ext cx="18000" cy="18000"/>
-                </a:xfrm>
-                <a:prstGeom prst="rect">
-                  <a:avLst/>
-                </a:prstGeom>
-              </p:spPr>
-            </p:pic>
-          </mc:Fallback>
-        </mc:AlternateContent>
-      </p:grpSp>
-      <mc:AlternateContent xmlns:mc="http://schemas.openxmlformats.org/markup-compatibility/2006" xmlns:p14="http://schemas.microsoft.com/office/powerpoint/2010/main">
-        <mc:Choice Requires="p14">
-          <p:contentPart p14:bwMode="auto" r:id="rId12">
-            <p14:nvContentPartPr>
-              <p14:cNvPr id="27" name="Ink 26">
-                <a:extLst>
-                  <a:ext uri="{FF2B5EF4-FFF2-40B4-BE49-F238E27FC236}">
-                    <a16:creationId xmlns:a16="http://schemas.microsoft.com/office/drawing/2014/main" id="{A972B3E4-9F40-41BC-B227-FBC0DC980A1A}"/>
-                  </a:ext>
-                </a:extLst>
-              </p14:cNvPr>
-              <p14:cNvContentPartPr/>
-              <p14:nvPr/>
-            </p14:nvContentPartPr>
-            <p14:xfrm>
-              <a:off x="6685742" y="4554776"/>
-              <a:ext cx="360" cy="360"/>
-            </p14:xfrm>
-          </p:contentPart>
-        </mc:Choice>
-        <mc:Fallback xmlns="">
-          <p:pic>
-            <p:nvPicPr>
-              <p:cNvPr id="27" name="Ink 26">
-                <a:extLst>
-                  <a:ext uri="{FF2B5EF4-FFF2-40B4-BE49-F238E27FC236}">
-                    <a16:creationId xmlns:a16="http://schemas.microsoft.com/office/drawing/2014/main" id="{A972B3E4-9F40-41BC-B227-FBC0DC980A1A}"/>
-                  </a:ext>
-                </a:extLst>
-              </p:cNvPr>
-              <p:cNvPicPr/>
-              <p:nvPr/>
-            </p:nvPicPr>
-            <p:blipFill>
-              <a:blip r:embed="rId7"/>
-              <a:stretch>
-                <a:fillRect/>
-              </a:stretch>
-            </p:blipFill>
-            <p:spPr>
-              <a:xfrm>
-                <a:off x="6676742" y="4545776"/>
-                <a:ext cx="18000" cy="18000"/>
-              </a:xfrm>
-              <a:prstGeom prst="rect">
-                <a:avLst/>
-              </a:prstGeom>
-            </p:spPr>
-          </p:pic>
-        </mc:Fallback>
-      </mc:AlternateContent>
-      <mc:AlternateContent xmlns:mc="http://schemas.openxmlformats.org/markup-compatibility/2006" xmlns:p14="http://schemas.microsoft.com/office/powerpoint/2010/main">
-        <mc:Choice Requires="p14">
-          <p:contentPart p14:bwMode="auto" r:id="rId13">
-            <p14:nvContentPartPr>
-              <p14:cNvPr id="28" name="Ink 27">
-                <a:extLst>
-                  <a:ext uri="{FF2B5EF4-FFF2-40B4-BE49-F238E27FC236}">
-                    <a16:creationId xmlns:a16="http://schemas.microsoft.com/office/drawing/2014/main" id="{5F52BBD7-05C1-42C4-8AF9-221B2CE8678E}"/>
-                  </a:ext>
-                </a:extLst>
-              </p14:cNvPr>
-              <p14:cNvContentPartPr/>
-              <p14:nvPr/>
-            </p14:nvContentPartPr>
-            <p14:xfrm>
-              <a:off x="6702302" y="4429136"/>
-              <a:ext cx="360" cy="360"/>
-            </p14:xfrm>
-          </p:contentPart>
-        </mc:Choice>
-        <mc:Fallback xmlns="">
-          <p:pic>
-            <p:nvPicPr>
-              <p:cNvPr id="28" name="Ink 27">
-                <a:extLst>
-                  <a:ext uri="{FF2B5EF4-FFF2-40B4-BE49-F238E27FC236}">
-                    <a16:creationId xmlns:a16="http://schemas.microsoft.com/office/drawing/2014/main" id="{5F52BBD7-05C1-42C4-8AF9-221B2CE8678E}"/>
-                  </a:ext>
-                </a:extLst>
-              </p:cNvPr>
-              <p:cNvPicPr/>
-              <p:nvPr/>
-            </p:nvPicPr>
-            <p:blipFill>
-              <a:blip r:embed="rId7"/>
-              <a:stretch>
-                <a:fillRect/>
-              </a:stretch>
-            </p:blipFill>
-            <p:spPr>
-              <a:xfrm>
-                <a:off x="6693302" y="4420136"/>
-                <a:ext cx="18000" cy="18000"/>
-              </a:xfrm>
-              <a:prstGeom prst="rect">
-                <a:avLst/>
-              </a:prstGeom>
-            </p:spPr>
-          </p:pic>
-        </mc:Fallback>
-      </mc:AlternateContent>
-      <mc:AlternateContent xmlns:mc="http://schemas.openxmlformats.org/markup-compatibility/2006" xmlns:p14="http://schemas.microsoft.com/office/powerpoint/2010/main">
-        <mc:Choice Requires="p14">
-          <p:contentPart p14:bwMode="auto" r:id="rId14">
-            <p14:nvContentPartPr>
-              <p14:cNvPr id="29" name="Ink 28">
-                <a:extLst>
-                  <a:ext uri="{FF2B5EF4-FFF2-40B4-BE49-F238E27FC236}">
-                    <a16:creationId xmlns:a16="http://schemas.microsoft.com/office/drawing/2014/main" id="{53708407-58C1-48B4-8CBE-6501DD4D2658}"/>
-                  </a:ext>
-                </a:extLst>
-              </p14:cNvPr>
-              <p14:cNvContentPartPr/>
-              <p14:nvPr/>
-            </p14:nvContentPartPr>
-            <p14:xfrm>
-              <a:off x="6694022" y="4320056"/>
-              <a:ext cx="360" cy="360"/>
-            </p14:xfrm>
-          </p:contentPart>
-        </mc:Choice>
-        <mc:Fallback xmlns="">
-          <p:pic>
-            <p:nvPicPr>
-              <p:cNvPr id="29" name="Ink 28">
-                <a:extLst>
-                  <a:ext uri="{FF2B5EF4-FFF2-40B4-BE49-F238E27FC236}">
-                    <a16:creationId xmlns:a16="http://schemas.microsoft.com/office/drawing/2014/main" id="{53708407-58C1-48B4-8CBE-6501DD4D2658}"/>
-                  </a:ext>
-                </a:extLst>
-              </p:cNvPr>
-              <p:cNvPicPr/>
-              <p:nvPr/>
-            </p:nvPicPr>
-            <p:blipFill>
-              <a:blip r:embed="rId7"/>
-              <a:stretch>
-                <a:fillRect/>
-              </a:stretch>
-            </p:blipFill>
-            <p:spPr>
-              <a:xfrm>
-                <a:off x="6685022" y="4311416"/>
-                <a:ext cx="18000" cy="18000"/>
-              </a:xfrm>
-              <a:prstGeom prst="rect">
-                <a:avLst/>
-              </a:prstGeom>
-            </p:spPr>
-          </p:pic>
-        </mc:Fallback>
-      </mc:AlternateContent>
-      <mc:AlternateContent xmlns:mc="http://schemas.openxmlformats.org/markup-compatibility/2006" xmlns:p14="http://schemas.microsoft.com/office/powerpoint/2010/main">
-        <mc:Choice Requires="p14">
-          <p:contentPart p14:bwMode="auto" r:id="rId15">
-            <p14:nvContentPartPr>
-              <p14:cNvPr id="30" name="Ink 29">
-                <a:extLst>
-                  <a:ext uri="{FF2B5EF4-FFF2-40B4-BE49-F238E27FC236}">
-                    <a16:creationId xmlns:a16="http://schemas.microsoft.com/office/drawing/2014/main" id="{F0C8447A-CEC3-49FC-888C-FA28AD34BEED}"/>
-                  </a:ext>
-                </a:extLst>
-              </p14:cNvPr>
-              <p14:cNvContentPartPr/>
-              <p14:nvPr/>
-            </p14:nvContentPartPr>
-            <p14:xfrm>
-              <a:off x="6694022" y="4151936"/>
-              <a:ext cx="360" cy="360"/>
-            </p14:xfrm>
-          </p:contentPart>
-        </mc:Choice>
-        <mc:Fallback xmlns="">
-          <p:pic>
-            <p:nvPicPr>
-              <p:cNvPr id="30" name="Ink 29">
-                <a:extLst>
-                  <a:ext uri="{FF2B5EF4-FFF2-40B4-BE49-F238E27FC236}">
-                    <a16:creationId xmlns:a16="http://schemas.microsoft.com/office/drawing/2014/main" id="{F0C8447A-CEC3-49FC-888C-FA28AD34BEED}"/>
-                  </a:ext>
-                </a:extLst>
-              </p:cNvPr>
-              <p:cNvPicPr/>
-              <p:nvPr/>
-            </p:nvPicPr>
-            <p:blipFill>
-              <a:blip r:embed="rId7"/>
-              <a:stretch>
-                <a:fillRect/>
-              </a:stretch>
-            </p:blipFill>
-            <p:spPr>
-              <a:xfrm>
-                <a:off x="6685022" y="4143296"/>
-                <a:ext cx="18000" cy="18000"/>
-              </a:xfrm>
-              <a:prstGeom prst="rect">
-                <a:avLst/>
-              </a:prstGeom>
-            </p:spPr>
-          </p:pic>
-        </mc:Fallback>
-      </mc:AlternateContent>
-      <p:grpSp>
-        <p:nvGrpSpPr>
-          <p:cNvPr id="36" name="Group 35">
-            <a:extLst>
-              <a:ext uri="{FF2B5EF4-FFF2-40B4-BE49-F238E27FC236}">
-                <a16:creationId xmlns:a16="http://schemas.microsoft.com/office/drawing/2014/main" id="{72034919-09DB-4E49-B048-D5535CE59DBF}"/>
-              </a:ext>
-            </a:extLst>
-          </p:cNvPr>
-          <p:cNvGrpSpPr/>
-          <p:nvPr/>
-        </p:nvGrpSpPr>
-        <p:grpSpPr>
-          <a:xfrm>
-            <a:off x="6573782" y="3875456"/>
-            <a:ext cx="233280" cy="192960"/>
-            <a:chOff x="6573782" y="3875456"/>
-            <a:chExt cx="233280" cy="192960"/>
-          </a:xfrm>
-        </p:grpSpPr>
-        <mc:AlternateContent xmlns:mc="http://schemas.openxmlformats.org/markup-compatibility/2006" xmlns:p14="http://schemas.microsoft.com/office/powerpoint/2010/main">
-          <mc:Choice Requires="p14">
-            <p:contentPart p14:bwMode="auto" r:id="rId16">
-              <p14:nvContentPartPr>
-                <p14:cNvPr id="31" name="Ink 30">
-                  <a:extLst>
-                    <a:ext uri="{FF2B5EF4-FFF2-40B4-BE49-F238E27FC236}">
-                      <a16:creationId xmlns:a16="http://schemas.microsoft.com/office/drawing/2014/main" id="{273F7C62-BA1D-423F-888B-B2C597E3F404}"/>
-                    </a:ext>
-                  </a:extLst>
-                </p14:cNvPr>
-                <p14:cNvContentPartPr/>
-                <p14:nvPr/>
-              </p14:nvContentPartPr>
-              <p14:xfrm>
-                <a:off x="6702302" y="4043216"/>
-                <a:ext cx="360" cy="360"/>
-              </p14:xfrm>
-            </p:contentPart>
-          </mc:Choice>
-          <mc:Fallback xmlns="">
-            <p:pic>
-              <p:nvPicPr>
-                <p:cNvPr id="31" name="Ink 30">
-                  <a:extLst>
-                    <a:ext uri="{FF2B5EF4-FFF2-40B4-BE49-F238E27FC236}">
-                      <a16:creationId xmlns:a16="http://schemas.microsoft.com/office/drawing/2014/main" id="{273F7C62-BA1D-423F-888B-B2C597E3F404}"/>
-                    </a:ext>
-                  </a:extLst>
-                </p:cNvPr>
-                <p:cNvPicPr/>
-                <p:nvPr/>
-              </p:nvPicPr>
-              <p:blipFill>
-                <a:blip r:embed="rId7"/>
-                <a:stretch>
-                  <a:fillRect/>
-                </a:stretch>
-              </p:blipFill>
-              <p:spPr>
-                <a:xfrm>
-                  <a:off x="6693302" y="4034216"/>
-                  <a:ext cx="18000" cy="18000"/>
-                </a:xfrm>
-                <a:prstGeom prst="rect">
-                  <a:avLst/>
-                </a:prstGeom>
-              </p:spPr>
-            </p:pic>
-          </mc:Fallback>
-        </mc:AlternateContent>
-        <mc:AlternateContent xmlns:mc="http://schemas.openxmlformats.org/markup-compatibility/2006" xmlns:p14="http://schemas.microsoft.com/office/powerpoint/2010/main">
-          <mc:Choice Requires="p14">
-            <p:contentPart p14:bwMode="auto" r:id="rId17">
-              <p14:nvContentPartPr>
-                <p14:cNvPr id="32" name="Ink 31">
-                  <a:extLst>
-                    <a:ext uri="{FF2B5EF4-FFF2-40B4-BE49-F238E27FC236}">
-                      <a16:creationId xmlns:a16="http://schemas.microsoft.com/office/drawing/2014/main" id="{5A3F52BB-D138-4CEC-BD59-C5F2FED2E4CE}"/>
-                    </a:ext>
-                  </a:extLst>
-                </p14:cNvPr>
-                <p14:cNvContentPartPr/>
-                <p14:nvPr/>
-              </p14:nvContentPartPr>
-              <p14:xfrm>
-                <a:off x="6694022" y="3942416"/>
-                <a:ext cx="360" cy="360"/>
-              </p14:xfrm>
-            </p:contentPart>
-          </mc:Choice>
-          <mc:Fallback xmlns="">
-            <p:pic>
-              <p:nvPicPr>
-                <p:cNvPr id="32" name="Ink 31">
-                  <a:extLst>
-                    <a:ext uri="{FF2B5EF4-FFF2-40B4-BE49-F238E27FC236}">
-                      <a16:creationId xmlns:a16="http://schemas.microsoft.com/office/drawing/2014/main" id="{5A3F52BB-D138-4CEC-BD59-C5F2FED2E4CE}"/>
-                    </a:ext>
-                  </a:extLst>
-                </p:cNvPr>
-                <p:cNvPicPr/>
-                <p:nvPr/>
-              </p:nvPicPr>
-              <p:blipFill>
-                <a:blip r:embed="rId7"/>
-                <a:stretch>
-                  <a:fillRect/>
-                </a:stretch>
-              </p:blipFill>
-              <p:spPr>
-                <a:xfrm>
-                  <a:off x="6685022" y="3933416"/>
-                  <a:ext cx="18000" cy="18000"/>
-                </a:xfrm>
-                <a:prstGeom prst="rect">
-                  <a:avLst/>
-                </a:prstGeom>
-              </p:spPr>
-            </p:pic>
-          </mc:Fallback>
-        </mc:AlternateContent>
-        <mc:AlternateContent xmlns:mc="http://schemas.openxmlformats.org/markup-compatibility/2006" xmlns:p14="http://schemas.microsoft.com/office/powerpoint/2010/main">
-          <mc:Choice Requires="p14">
-            <p:contentPart p14:bwMode="auto" r:id="rId18">
-              <p14:nvContentPartPr>
-                <p14:cNvPr id="33" name="Ink 32">
-                  <a:extLst>
-                    <a:ext uri="{FF2B5EF4-FFF2-40B4-BE49-F238E27FC236}">
-                      <a16:creationId xmlns:a16="http://schemas.microsoft.com/office/drawing/2014/main" id="{8D5B7FA9-FDC8-4FD3-9C88-BB8D1B1BABE8}"/>
-                    </a:ext>
-                  </a:extLst>
-                </p14:cNvPr>
-                <p14:cNvContentPartPr/>
-                <p14:nvPr/>
-              </p14:nvContentPartPr>
-              <p14:xfrm>
-                <a:off x="6694022" y="3892016"/>
-                <a:ext cx="113040" cy="137520"/>
-              </p14:xfrm>
-            </p:contentPart>
-          </mc:Choice>
-          <mc:Fallback xmlns="">
-            <p:pic>
-              <p:nvPicPr>
-                <p:cNvPr id="33" name="Ink 32">
-                  <a:extLst>
-                    <a:ext uri="{FF2B5EF4-FFF2-40B4-BE49-F238E27FC236}">
-                      <a16:creationId xmlns:a16="http://schemas.microsoft.com/office/drawing/2014/main" id="{8D5B7FA9-FDC8-4FD3-9C88-BB8D1B1BABE8}"/>
-                    </a:ext>
-                  </a:extLst>
-                </p:cNvPr>
-                <p:cNvPicPr/>
-                <p:nvPr/>
-              </p:nvPicPr>
-              <p:blipFill>
-                <a:blip r:embed="rId19"/>
-                <a:stretch>
-                  <a:fillRect/>
-                </a:stretch>
-              </p:blipFill>
-              <p:spPr>
-                <a:xfrm>
-                  <a:off x="6685022" y="3883376"/>
-                  <a:ext cx="130680" cy="155160"/>
-                </a:xfrm>
-                <a:prstGeom prst="rect">
-                  <a:avLst/>
-                </a:prstGeom>
-              </p:spPr>
-            </p:pic>
-          </mc:Fallback>
-        </mc:AlternateContent>
-        <mc:AlternateContent xmlns:mc="http://schemas.openxmlformats.org/markup-compatibility/2006" xmlns:p14="http://schemas.microsoft.com/office/powerpoint/2010/main">
-          <mc:Choice Requires="p14">
-            <p:contentPart p14:bwMode="auto" r:id="rId20">
-              <p14:nvContentPartPr>
-                <p14:cNvPr id="35" name="Ink 34">
-                  <a:extLst>
-                    <a:ext uri="{FF2B5EF4-FFF2-40B4-BE49-F238E27FC236}">
-                      <a16:creationId xmlns:a16="http://schemas.microsoft.com/office/drawing/2014/main" id="{1EFB7FB9-37B0-45D9-96A2-2A382ADDD1C5}"/>
-                    </a:ext>
-                  </a:extLst>
-                </p14:cNvPr>
-                <p14:cNvContentPartPr/>
-                <p14:nvPr/>
-              </p14:nvContentPartPr>
-              <p14:xfrm>
-                <a:off x="6573782" y="3875456"/>
-                <a:ext cx="95760" cy="192960"/>
-              </p14:xfrm>
-            </p:contentPart>
-          </mc:Choice>
-          <mc:Fallback xmlns="">
-            <p:pic>
-              <p:nvPicPr>
-                <p:cNvPr id="35" name="Ink 34">
-                  <a:extLst>
-                    <a:ext uri="{FF2B5EF4-FFF2-40B4-BE49-F238E27FC236}">
-                      <a16:creationId xmlns:a16="http://schemas.microsoft.com/office/drawing/2014/main" id="{1EFB7FB9-37B0-45D9-96A2-2A382ADDD1C5}"/>
-                    </a:ext>
-                  </a:extLst>
-                </p:cNvPr>
-                <p:cNvPicPr/>
-                <p:nvPr/>
-              </p:nvPicPr>
-              <p:blipFill>
-                <a:blip r:embed="rId21"/>
-                <a:stretch>
-                  <a:fillRect/>
-                </a:stretch>
-              </p:blipFill>
-              <p:spPr>
-                <a:xfrm>
-                  <a:off x="6564782" y="3866456"/>
-                  <a:ext cx="113400" cy="210600"/>
-                </a:xfrm>
-                <a:prstGeom prst="rect">
-                  <a:avLst/>
-                </a:prstGeom>
-              </p:spPr>
-            </p:pic>
-          </mc:Fallback>
-        </mc:AlternateContent>
-      </p:grpSp>
-      <p:sp>
-        <p:nvSpPr>
-          <p:cNvPr id="37" name="Diamond 36">
-            <a:extLst>
-              <a:ext uri="{FF2B5EF4-FFF2-40B4-BE49-F238E27FC236}">
-                <a16:creationId xmlns:a16="http://schemas.microsoft.com/office/drawing/2014/main" id="{41541452-BA91-4C6A-874C-810EAB3372CB}"/>
-              </a:ext>
-            </a:extLst>
-          </p:cNvPr>
-          <p:cNvSpPr/>
-          <p:nvPr/>
-        </p:nvSpPr>
-        <p:spPr>
-          <a:xfrm>
-            <a:off x="7703541" y="583000"/>
-            <a:ext cx="466433" cy="321484"/>
-          </a:xfrm>
-          <a:prstGeom prst="diamond">
-            <a:avLst/>
-          </a:prstGeom>
-          <a:solidFill>
-            <a:schemeClr val="tx2"/>
-          </a:solidFill>
-        </p:spPr>
-        <p:style>
-          <a:lnRef idx="2">
-            <a:schemeClr val="accent1">
-              <a:shade val="50000"/>
-            </a:schemeClr>
-          </a:lnRef>
-          <a:fillRef idx="1">
-            <a:schemeClr val="accent1"/>
-          </a:fillRef>
-          <a:effectRef idx="0">
-            <a:schemeClr val="accent1"/>
-          </a:effectRef>
-          <a:fontRef idx="minor">
-            <a:schemeClr val="lt1"/>
-          </a:fontRef>
-        </p:style>
-        <p:txBody>
-          <a:bodyPr rtlCol="0" anchor="ctr"/>
-          <a:lstStyle/>
-          <a:p>
-            <a:pPr algn="ctr"/>
-            <a:endParaRPr lang="en-US" dirty="0">
-              <a:latin typeface="Consolas" panose="020B0609020204030204" pitchFamily="49" charset="0"/>
-            </a:endParaRPr>
-          </a:p>
-        </p:txBody>
-      </p:sp>
+      </p:pic>
     </p:spTree>
     <p:extLst>
       <p:ext uri="{BB962C8B-B14F-4D97-AF65-F5344CB8AC3E}">
-        <p14:creationId xmlns:p14="http://schemas.microsoft.com/office/powerpoint/2010/main" val="3454987196"/>
+        <p14:creationId xmlns:p14="http://schemas.microsoft.com/office/powerpoint/2010/main" val="2770800665"/>
       </p:ext>
     </p:extLst>
   </p:cSld>

</xml_diff>